<commit_message>
json week9 and api week 10
</commit_message>
<xml_diff>
--- a/api/Documents/API’s.pptx
+++ b/api/Documents/API’s.pptx
@@ -4,6 +4,9 @@
   <p:sldMasterIdLst>
     <p:sldMasterId id="2147483674" r:id="rId1"/>
   </p:sldMasterIdLst>
+  <p:notesMasterIdLst>
+    <p:notesMasterId r:id="rId15"/>
+  </p:notesMasterIdLst>
   <p:sldIdLst>
     <p:sldId id="256" r:id="rId2"/>
     <p:sldId id="257" r:id="rId3"/>
@@ -11,6 +14,13 @@
     <p:sldId id="260" r:id="rId5"/>
     <p:sldId id="261" r:id="rId6"/>
     <p:sldId id="259" r:id="rId7"/>
+    <p:sldId id="263" r:id="rId8"/>
+    <p:sldId id="262" r:id="rId9"/>
+    <p:sldId id="264" r:id="rId10"/>
+    <p:sldId id="265" r:id="rId11"/>
+    <p:sldId id="266" r:id="rId12"/>
+    <p:sldId id="267" r:id="rId13"/>
+    <p:sldId id="268" r:id="rId14"/>
   </p:sldIdLst>
   <p:sldSz cx="12192000" cy="6858000"/>
   <p:notesSz cx="6858000" cy="9144000"/>
@@ -109,7 +119,2445 @@
       </a:defRPr>
     </a:lvl9pPr>
   </p:defaultTextStyle>
+  <p:extLst>
+    <p:ext uri="{EFAFB233-063F-42B5-8137-9DF3F51BA10A}">
+      <p15:sldGuideLst xmlns:p15="http://schemas.microsoft.com/office/powerpoint/2012/main"/>
+    </p:ext>
+  </p:extLst>
 </p:presentation>
+</file>
+
+<file path=ppt/notesMasters/notesMaster1.xml><?xml version="1.0" encoding="utf-8"?>
+<p:notesMaster xmlns:a="http://schemas.openxmlformats.org/drawingml/2006/main" xmlns:r="http://schemas.openxmlformats.org/officeDocument/2006/relationships" xmlns:p="http://schemas.openxmlformats.org/presentationml/2006/main">
+  <p:cSld>
+    <p:bg>
+      <p:bgRef idx="1001">
+        <a:schemeClr val="bg1"/>
+      </p:bgRef>
+    </p:bg>
+    <p:spTree>
+      <p:nvGrpSpPr>
+        <p:cNvPr id="1" name=""/>
+        <p:cNvGrpSpPr/>
+        <p:nvPr/>
+      </p:nvGrpSpPr>
+      <p:grpSpPr>
+        <a:xfrm>
+          <a:off x="0" y="0"/>
+          <a:ext cx="0" cy="0"/>
+          <a:chOff x="0" y="0"/>
+          <a:chExt cx="0" cy="0"/>
+        </a:xfrm>
+      </p:grpSpPr>
+      <p:sp>
+        <p:nvSpPr>
+          <p:cNvPr id="2" name="Header Placeholder 1"/>
+          <p:cNvSpPr>
+            <a:spLocks noGrp="1"/>
+          </p:cNvSpPr>
+          <p:nvPr>
+            <p:ph type="hdr" sz="quarter"/>
+          </p:nvPr>
+        </p:nvSpPr>
+        <p:spPr>
+          <a:xfrm>
+            <a:off x="0" y="0"/>
+            <a:ext cx="2971800" cy="458788"/>
+          </a:xfrm>
+          <a:prstGeom prst="rect">
+            <a:avLst/>
+          </a:prstGeom>
+        </p:spPr>
+        <p:txBody>
+          <a:bodyPr vert="horz" lIns="91440" tIns="45720" rIns="91440" bIns="45720" rtlCol="0"/>
+          <a:lstStyle>
+            <a:lvl1pPr algn="l">
+              <a:defRPr sz="1200"/>
+            </a:lvl1pPr>
+          </a:lstStyle>
+          <a:p>
+            <a:endParaRPr lang="en-US"/>
+          </a:p>
+        </p:txBody>
+      </p:sp>
+      <p:sp>
+        <p:nvSpPr>
+          <p:cNvPr id="3" name="Date Placeholder 2"/>
+          <p:cNvSpPr>
+            <a:spLocks noGrp="1"/>
+          </p:cNvSpPr>
+          <p:nvPr>
+            <p:ph type="dt" idx="1"/>
+          </p:nvPr>
+        </p:nvSpPr>
+        <p:spPr>
+          <a:xfrm>
+            <a:off x="3884613" y="0"/>
+            <a:ext cx="2971800" cy="458788"/>
+          </a:xfrm>
+          <a:prstGeom prst="rect">
+            <a:avLst/>
+          </a:prstGeom>
+        </p:spPr>
+        <p:txBody>
+          <a:bodyPr vert="horz" lIns="91440" tIns="45720" rIns="91440" bIns="45720" rtlCol="0"/>
+          <a:lstStyle>
+            <a:lvl1pPr algn="r">
+              <a:defRPr sz="1200"/>
+            </a:lvl1pPr>
+          </a:lstStyle>
+          <a:p>
+            <a:fld id="{ED14E87E-1473-4395-BD97-40394169FD47}" type="datetimeFigureOut">
+              <a:rPr lang="en-US" smtClean="0"/>
+              <a:t>11/4/2023</a:t>
+            </a:fld>
+            <a:endParaRPr lang="en-US"/>
+          </a:p>
+        </p:txBody>
+      </p:sp>
+      <p:sp>
+        <p:nvSpPr>
+          <p:cNvPr id="4" name="Slide Image Placeholder 3"/>
+          <p:cNvSpPr>
+            <a:spLocks noGrp="1" noRot="1" noChangeAspect="1"/>
+          </p:cNvSpPr>
+          <p:nvPr>
+            <p:ph type="sldImg" idx="2"/>
+          </p:nvPr>
+        </p:nvSpPr>
+        <p:spPr>
+          <a:xfrm>
+            <a:off x="685800" y="1143000"/>
+            <a:ext cx="5486400" cy="3086100"/>
+          </a:xfrm>
+          <a:prstGeom prst="rect">
+            <a:avLst/>
+          </a:prstGeom>
+          <a:noFill/>
+          <a:ln w="12700">
+            <a:solidFill>
+              <a:prstClr val="black"/>
+            </a:solidFill>
+          </a:ln>
+        </p:spPr>
+        <p:txBody>
+          <a:bodyPr vert="horz" lIns="91440" tIns="45720" rIns="91440" bIns="45720" rtlCol="0" anchor="ctr"/>
+          <a:lstStyle/>
+          <a:p>
+            <a:endParaRPr lang="en-US"/>
+          </a:p>
+        </p:txBody>
+      </p:sp>
+      <p:sp>
+        <p:nvSpPr>
+          <p:cNvPr id="5" name="Notes Placeholder 4"/>
+          <p:cNvSpPr>
+            <a:spLocks noGrp="1"/>
+          </p:cNvSpPr>
+          <p:nvPr>
+            <p:ph type="body" sz="quarter" idx="3"/>
+          </p:nvPr>
+        </p:nvSpPr>
+        <p:spPr>
+          <a:xfrm>
+            <a:off x="685800" y="4400550"/>
+            <a:ext cx="5486400" cy="3600450"/>
+          </a:xfrm>
+          <a:prstGeom prst="rect">
+            <a:avLst/>
+          </a:prstGeom>
+        </p:spPr>
+        <p:txBody>
+          <a:bodyPr vert="horz" lIns="91440" tIns="45720" rIns="91440" bIns="45720" rtlCol="0"/>
+          <a:lstStyle/>
+          <a:p>
+            <a:pPr lvl="0"/>
+            <a:r>
+              <a:rPr lang="en-US"/>
+              <a:t>Click to edit Master text styles</a:t>
+            </a:r>
+          </a:p>
+          <a:p>
+            <a:pPr lvl="1"/>
+            <a:r>
+              <a:rPr lang="en-US"/>
+              <a:t>Second level</a:t>
+            </a:r>
+          </a:p>
+          <a:p>
+            <a:pPr lvl="2"/>
+            <a:r>
+              <a:rPr lang="en-US"/>
+              <a:t>Third level</a:t>
+            </a:r>
+          </a:p>
+          <a:p>
+            <a:pPr lvl="3"/>
+            <a:r>
+              <a:rPr lang="en-US"/>
+              <a:t>Fourth level</a:t>
+            </a:r>
+          </a:p>
+          <a:p>
+            <a:pPr lvl="4"/>
+            <a:r>
+              <a:rPr lang="en-US"/>
+              <a:t>Fifth level</a:t>
+            </a:r>
+          </a:p>
+        </p:txBody>
+      </p:sp>
+      <p:sp>
+        <p:nvSpPr>
+          <p:cNvPr id="6" name="Footer Placeholder 5"/>
+          <p:cNvSpPr>
+            <a:spLocks noGrp="1"/>
+          </p:cNvSpPr>
+          <p:nvPr>
+            <p:ph type="ftr" sz="quarter" idx="4"/>
+          </p:nvPr>
+        </p:nvSpPr>
+        <p:spPr>
+          <a:xfrm>
+            <a:off x="0" y="8685213"/>
+            <a:ext cx="2971800" cy="458787"/>
+          </a:xfrm>
+          <a:prstGeom prst="rect">
+            <a:avLst/>
+          </a:prstGeom>
+        </p:spPr>
+        <p:txBody>
+          <a:bodyPr vert="horz" lIns="91440" tIns="45720" rIns="91440" bIns="45720" rtlCol="0" anchor="b"/>
+          <a:lstStyle>
+            <a:lvl1pPr algn="l">
+              <a:defRPr sz="1200"/>
+            </a:lvl1pPr>
+          </a:lstStyle>
+          <a:p>
+            <a:endParaRPr lang="en-US"/>
+          </a:p>
+        </p:txBody>
+      </p:sp>
+      <p:sp>
+        <p:nvSpPr>
+          <p:cNvPr id="7" name="Slide Number Placeholder 6"/>
+          <p:cNvSpPr>
+            <a:spLocks noGrp="1"/>
+          </p:cNvSpPr>
+          <p:nvPr>
+            <p:ph type="sldNum" sz="quarter" idx="5"/>
+          </p:nvPr>
+        </p:nvSpPr>
+        <p:spPr>
+          <a:xfrm>
+            <a:off x="3884613" y="8685213"/>
+            <a:ext cx="2971800" cy="458787"/>
+          </a:xfrm>
+          <a:prstGeom prst="rect">
+            <a:avLst/>
+          </a:prstGeom>
+        </p:spPr>
+        <p:txBody>
+          <a:bodyPr vert="horz" lIns="91440" tIns="45720" rIns="91440" bIns="45720" rtlCol="0" anchor="b"/>
+          <a:lstStyle>
+            <a:lvl1pPr algn="r">
+              <a:defRPr sz="1200"/>
+            </a:lvl1pPr>
+          </a:lstStyle>
+          <a:p>
+            <a:fld id="{9DCE2504-C28B-4080-B704-27D98903179C}" type="slidenum">
+              <a:rPr lang="en-US" smtClean="0"/>
+              <a:t>‹#›</a:t>
+            </a:fld>
+            <a:endParaRPr lang="en-US"/>
+          </a:p>
+        </p:txBody>
+      </p:sp>
+    </p:spTree>
+    <p:extLst>
+      <p:ext uri="{BB962C8B-B14F-4D97-AF65-F5344CB8AC3E}">
+        <p14:creationId xmlns:p14="http://schemas.microsoft.com/office/powerpoint/2010/main" val="3092770318"/>
+      </p:ext>
+    </p:extLst>
+  </p:cSld>
+  <p:clrMap bg1="lt1" tx1="dk1" bg2="lt2" tx2="dk2" accent1="accent1" accent2="accent2" accent3="accent3" accent4="accent4" accent5="accent5" accent6="accent6" hlink="hlink" folHlink="folHlink"/>
+  <p:notesStyle>
+    <a:lvl1pPr marL="0" algn="l" defTabSz="914400" rtl="0" eaLnBrk="1" latinLnBrk="0" hangingPunct="1">
+      <a:defRPr sz="1200" kern="1200">
+        <a:solidFill>
+          <a:schemeClr val="tx1"/>
+        </a:solidFill>
+        <a:latin typeface="+mn-lt"/>
+        <a:ea typeface="+mn-ea"/>
+        <a:cs typeface="+mn-cs"/>
+      </a:defRPr>
+    </a:lvl1pPr>
+    <a:lvl2pPr marL="457200" algn="l" defTabSz="914400" rtl="0" eaLnBrk="1" latinLnBrk="0" hangingPunct="1">
+      <a:defRPr sz="1200" kern="1200">
+        <a:solidFill>
+          <a:schemeClr val="tx1"/>
+        </a:solidFill>
+        <a:latin typeface="+mn-lt"/>
+        <a:ea typeface="+mn-ea"/>
+        <a:cs typeface="+mn-cs"/>
+      </a:defRPr>
+    </a:lvl2pPr>
+    <a:lvl3pPr marL="914400" algn="l" defTabSz="914400" rtl="0" eaLnBrk="1" latinLnBrk="0" hangingPunct="1">
+      <a:defRPr sz="1200" kern="1200">
+        <a:solidFill>
+          <a:schemeClr val="tx1"/>
+        </a:solidFill>
+        <a:latin typeface="+mn-lt"/>
+        <a:ea typeface="+mn-ea"/>
+        <a:cs typeface="+mn-cs"/>
+      </a:defRPr>
+    </a:lvl3pPr>
+    <a:lvl4pPr marL="1371600" algn="l" defTabSz="914400" rtl="0" eaLnBrk="1" latinLnBrk="0" hangingPunct="1">
+      <a:defRPr sz="1200" kern="1200">
+        <a:solidFill>
+          <a:schemeClr val="tx1"/>
+        </a:solidFill>
+        <a:latin typeface="+mn-lt"/>
+        <a:ea typeface="+mn-ea"/>
+        <a:cs typeface="+mn-cs"/>
+      </a:defRPr>
+    </a:lvl4pPr>
+    <a:lvl5pPr marL="1828800" algn="l" defTabSz="914400" rtl="0" eaLnBrk="1" latinLnBrk="0" hangingPunct="1">
+      <a:defRPr sz="1200" kern="1200">
+        <a:solidFill>
+          <a:schemeClr val="tx1"/>
+        </a:solidFill>
+        <a:latin typeface="+mn-lt"/>
+        <a:ea typeface="+mn-ea"/>
+        <a:cs typeface="+mn-cs"/>
+      </a:defRPr>
+    </a:lvl5pPr>
+    <a:lvl6pPr marL="2286000" algn="l" defTabSz="914400" rtl="0" eaLnBrk="1" latinLnBrk="0" hangingPunct="1">
+      <a:defRPr sz="1200" kern="1200">
+        <a:solidFill>
+          <a:schemeClr val="tx1"/>
+        </a:solidFill>
+        <a:latin typeface="+mn-lt"/>
+        <a:ea typeface="+mn-ea"/>
+        <a:cs typeface="+mn-cs"/>
+      </a:defRPr>
+    </a:lvl6pPr>
+    <a:lvl7pPr marL="2743200" algn="l" defTabSz="914400" rtl="0" eaLnBrk="1" latinLnBrk="0" hangingPunct="1">
+      <a:defRPr sz="1200" kern="1200">
+        <a:solidFill>
+          <a:schemeClr val="tx1"/>
+        </a:solidFill>
+        <a:latin typeface="+mn-lt"/>
+        <a:ea typeface="+mn-ea"/>
+        <a:cs typeface="+mn-cs"/>
+      </a:defRPr>
+    </a:lvl7pPr>
+    <a:lvl8pPr marL="3200400" algn="l" defTabSz="914400" rtl="0" eaLnBrk="1" latinLnBrk="0" hangingPunct="1">
+      <a:defRPr sz="1200" kern="1200">
+        <a:solidFill>
+          <a:schemeClr val="tx1"/>
+        </a:solidFill>
+        <a:latin typeface="+mn-lt"/>
+        <a:ea typeface="+mn-ea"/>
+        <a:cs typeface="+mn-cs"/>
+      </a:defRPr>
+    </a:lvl8pPr>
+    <a:lvl9pPr marL="3657600" algn="l" defTabSz="914400" rtl="0" eaLnBrk="1" latinLnBrk="0" hangingPunct="1">
+      <a:defRPr sz="1200" kern="1200">
+        <a:solidFill>
+          <a:schemeClr val="tx1"/>
+        </a:solidFill>
+        <a:latin typeface="+mn-lt"/>
+        <a:ea typeface="+mn-ea"/>
+        <a:cs typeface="+mn-cs"/>
+      </a:defRPr>
+    </a:lvl9pPr>
+  </p:notesStyle>
+</p:notesMaster>
+</file>
+
+<file path=ppt/notesSlides/notesSlide1.xml><?xml version="1.0" encoding="utf-8"?>
+<p:notes xmlns:a="http://schemas.openxmlformats.org/drawingml/2006/main" xmlns:r="http://schemas.openxmlformats.org/officeDocument/2006/relationships" xmlns:p="http://schemas.openxmlformats.org/presentationml/2006/main">
+  <p:cSld>
+    <p:spTree>
+      <p:nvGrpSpPr>
+        <p:cNvPr id="1" name=""/>
+        <p:cNvGrpSpPr/>
+        <p:nvPr/>
+      </p:nvGrpSpPr>
+      <p:grpSpPr>
+        <a:xfrm>
+          <a:off x="0" y="0"/>
+          <a:ext cx="0" cy="0"/>
+          <a:chOff x="0" y="0"/>
+          <a:chExt cx="0" cy="0"/>
+        </a:xfrm>
+      </p:grpSpPr>
+      <p:sp>
+        <p:nvSpPr>
+          <p:cNvPr id="2" name="Slide Image Placeholder 1"/>
+          <p:cNvSpPr>
+            <a:spLocks noGrp="1" noRot="1" noChangeAspect="1"/>
+          </p:cNvSpPr>
+          <p:nvPr>
+            <p:ph type="sldImg"/>
+          </p:nvPr>
+        </p:nvSpPr>
+        <p:spPr/>
+      </p:sp>
+      <p:sp>
+        <p:nvSpPr>
+          <p:cNvPr id="3" name="Notes Placeholder 2"/>
+          <p:cNvSpPr>
+            <a:spLocks noGrp="1"/>
+          </p:cNvSpPr>
+          <p:nvPr>
+            <p:ph type="body" idx="1"/>
+          </p:nvPr>
+        </p:nvSpPr>
+        <p:spPr/>
+        <p:txBody>
+          <a:bodyPr/>
+          <a:lstStyle/>
+          <a:p>
+            <a:pPr marL="0" marR="0">
+              <a:lnSpc>
+                <a:spcPct val="150000"/>
+              </a:lnSpc>
+              <a:spcBef>
+                <a:spcPts val="0"/>
+              </a:spcBef>
+              <a:spcAft>
+                <a:spcPts val="800"/>
+              </a:spcAft>
+            </a:pPr>
+            <a:r>
+              <a:rPr lang="en-US" sz="1800" kern="100" dirty="0">
+                <a:effectLst/>
+                <a:latin typeface="Calibri" panose="020F0502020204030204" pitchFamily="34" charset="0"/>
+                <a:ea typeface="Calibri" panose="020F0502020204030204" pitchFamily="34" charset="0"/>
+                <a:cs typeface="Times New Roman" panose="02020603050405020304" pitchFamily="18" charset="0"/>
+              </a:rPr>
+              <a:t>There are multiple API method and styles I have setup and used in the past.</a:t>
+            </a:r>
+          </a:p>
+          <a:p>
+            <a:pPr marL="0" marR="0">
+              <a:lnSpc>
+                <a:spcPct val="150000"/>
+              </a:lnSpc>
+              <a:spcBef>
+                <a:spcPts val="0"/>
+              </a:spcBef>
+              <a:spcAft>
+                <a:spcPts val="800"/>
+              </a:spcAft>
+            </a:pPr>
+            <a:r>
+              <a:rPr lang="en-US" sz="1800" kern="100" dirty="0">
+                <a:effectLst/>
+                <a:latin typeface="Calibri" panose="020F0502020204030204" pitchFamily="34" charset="0"/>
+                <a:ea typeface="Calibri" panose="020F0502020204030204" pitchFamily="34" charset="0"/>
+                <a:cs typeface="Times New Roman" panose="02020603050405020304" pitchFamily="18" charset="0"/>
+              </a:rPr>
+              <a:t>Webhooks – is a trigger event response usually server based</a:t>
+            </a:r>
+          </a:p>
+          <a:p>
+            <a:pPr marL="0" marR="0">
+              <a:lnSpc>
+                <a:spcPct val="150000"/>
+              </a:lnSpc>
+              <a:spcBef>
+                <a:spcPts val="0"/>
+              </a:spcBef>
+              <a:spcAft>
+                <a:spcPts val="800"/>
+              </a:spcAft>
+            </a:pPr>
+            <a:r>
+              <a:rPr lang="en-US" sz="1800" kern="100" dirty="0">
+                <a:effectLst/>
+                <a:latin typeface="Calibri" panose="020F0502020204030204" pitchFamily="34" charset="0"/>
+                <a:ea typeface="Calibri" panose="020F0502020204030204" pitchFamily="34" charset="0"/>
+                <a:cs typeface="Times New Roman" panose="02020603050405020304" pitchFamily="18" charset="0"/>
+              </a:rPr>
+              <a:t>We use this at work as a trigger when an invoice or purchase order was generated to automatically send it to the customer or vendor. We also did this for bank reconciliation where one would compare the checks being paid against the accounting systems records. One last place we used this was in paying out taxes to the state as we did not pay taxes on equipment in our processing plant an if we paid our own tax we received a reduction from the state by 2% which ends up being hundreds of thousands of dollars in a year.  And millions for the three years we were allowed to go back and claim it.</a:t>
+            </a:r>
+          </a:p>
+          <a:p>
+            <a:pPr marL="0" marR="0">
+              <a:lnSpc>
+                <a:spcPct val="150000"/>
+              </a:lnSpc>
+              <a:spcBef>
+                <a:spcPts val="0"/>
+              </a:spcBef>
+              <a:spcAft>
+                <a:spcPts val="800"/>
+              </a:spcAft>
+            </a:pPr>
+            <a:r>
+              <a:rPr lang="en-US" sz="1800" kern="100" dirty="0">
+                <a:effectLst/>
+                <a:latin typeface="Calibri" panose="020F0502020204030204" pitchFamily="34" charset="0"/>
+                <a:ea typeface="Calibri" panose="020F0502020204030204" pitchFamily="34" charset="0"/>
+                <a:cs typeface="Times New Roman" panose="02020603050405020304" pitchFamily="18" charset="0"/>
+              </a:rPr>
+              <a:t> </a:t>
+            </a:r>
+          </a:p>
+          <a:p>
+            <a:pPr marL="0" marR="0">
+              <a:lnSpc>
+                <a:spcPct val="150000"/>
+              </a:lnSpc>
+              <a:spcBef>
+                <a:spcPts val="0"/>
+              </a:spcBef>
+              <a:spcAft>
+                <a:spcPts val="800"/>
+              </a:spcAft>
+            </a:pPr>
+            <a:r>
+              <a:rPr lang="en-US" sz="1800" kern="100" dirty="0">
+                <a:effectLst/>
+                <a:latin typeface="Calibri" panose="020F0502020204030204" pitchFamily="34" charset="0"/>
+                <a:ea typeface="Calibri" panose="020F0502020204030204" pitchFamily="34" charset="0"/>
+                <a:cs typeface="Times New Roman" panose="02020603050405020304" pitchFamily="18" charset="0"/>
+              </a:rPr>
+              <a:t>WebSocket is a protocol that allows for full-duplex communication over a persistent connection, making it suitable for real-time applications. Unlike the request-response model of HTTP, WebSocket keeps the connection open, allowing for continuous bidirectional data exchange. It can be used with various programming languages, including C, Python, JavaScript, and more, to facilitate real-time interactions in applications such as live chats, gaming, and live data updates. We uses a completely isolated version of this to control pumps and valves at one of our plants going to a dock. I also used this in an client and server application I created which could send pertinent information back and forth. You might be familiar with many of the messaging services or stock tickers which may use this service format.</a:t>
+            </a:r>
+          </a:p>
+          <a:p>
+            <a:pPr marL="0" marR="0">
+              <a:lnSpc>
+                <a:spcPct val="150000"/>
+              </a:lnSpc>
+              <a:spcBef>
+                <a:spcPts val="0"/>
+              </a:spcBef>
+              <a:spcAft>
+                <a:spcPts val="800"/>
+              </a:spcAft>
+            </a:pPr>
+            <a:r>
+              <a:rPr lang="en-US" sz="1800" kern="100" dirty="0">
+                <a:effectLst/>
+                <a:latin typeface="Calibri" panose="020F0502020204030204" pitchFamily="34" charset="0"/>
+                <a:ea typeface="Calibri" panose="020F0502020204030204" pitchFamily="34" charset="0"/>
+                <a:cs typeface="Times New Roman" panose="02020603050405020304" pitchFamily="18" charset="0"/>
+              </a:rPr>
+              <a:t> </a:t>
+            </a:r>
+          </a:p>
+          <a:p>
+            <a:pPr marL="0" marR="0">
+              <a:lnSpc>
+                <a:spcPct val="150000"/>
+              </a:lnSpc>
+              <a:spcBef>
+                <a:spcPts val="0"/>
+              </a:spcBef>
+              <a:spcAft>
+                <a:spcPts val="800"/>
+              </a:spcAft>
+            </a:pPr>
+            <a:r>
+              <a:rPr lang="en-US" sz="1800" kern="100" dirty="0">
+                <a:effectLst/>
+                <a:latin typeface="Calibri" panose="020F0502020204030204" pitchFamily="34" charset="0"/>
+                <a:ea typeface="Calibri" panose="020F0502020204030204" pitchFamily="34" charset="0"/>
+                <a:cs typeface="Times New Roman" panose="02020603050405020304" pitchFamily="18" charset="0"/>
+              </a:rPr>
+              <a:t>There are many others which I have not used lately.</a:t>
+            </a:r>
+          </a:p>
+          <a:p>
+            <a:pPr marL="0" marR="0">
+              <a:lnSpc>
+                <a:spcPct val="150000"/>
+              </a:lnSpc>
+              <a:spcBef>
+                <a:spcPts val="0"/>
+              </a:spcBef>
+              <a:spcAft>
+                <a:spcPts val="800"/>
+              </a:spcAft>
+            </a:pPr>
+            <a:r>
+              <a:rPr lang="en-US" sz="1800" b="1" kern="100" dirty="0" err="1">
+                <a:effectLst/>
+                <a:latin typeface="Calibri" panose="020F0502020204030204" pitchFamily="34" charset="0"/>
+                <a:ea typeface="Calibri" panose="020F0502020204030204" pitchFamily="34" charset="0"/>
+                <a:cs typeface="Times New Roman" panose="02020603050405020304" pitchFamily="18" charset="0"/>
+              </a:rPr>
+              <a:t>GraphQL</a:t>
+            </a:r>
+            <a:r>
+              <a:rPr lang="en-US" sz="1800" b="1" kern="100" dirty="0">
+                <a:effectLst/>
+                <a:latin typeface="Calibri" panose="020F0502020204030204" pitchFamily="34" charset="0"/>
+                <a:ea typeface="Calibri" panose="020F0502020204030204" pitchFamily="34" charset="0"/>
+                <a:cs typeface="Times New Roman" panose="02020603050405020304" pitchFamily="18" charset="0"/>
+              </a:rPr>
+              <a:t>:</a:t>
+            </a:r>
+            <a:endParaRPr lang="en-US" sz="1800" kern="100" dirty="0">
+              <a:effectLst/>
+              <a:latin typeface="Calibri" panose="020F0502020204030204" pitchFamily="34" charset="0"/>
+              <a:ea typeface="Calibri" panose="020F0502020204030204" pitchFamily="34" charset="0"/>
+              <a:cs typeface="Times New Roman" panose="02020603050405020304" pitchFamily="18" charset="0"/>
+            </a:endParaRPr>
+          </a:p>
+          <a:p>
+            <a:pPr marL="0" marR="0">
+              <a:lnSpc>
+                <a:spcPct val="150000"/>
+              </a:lnSpc>
+              <a:spcBef>
+                <a:spcPts val="0"/>
+              </a:spcBef>
+              <a:spcAft>
+                <a:spcPts val="800"/>
+              </a:spcAft>
+            </a:pPr>
+            <a:r>
+              <a:rPr lang="en-US" sz="1800" kern="100" dirty="0">
+                <a:effectLst/>
+                <a:latin typeface="Calibri" panose="020F0502020204030204" pitchFamily="34" charset="0"/>
+                <a:ea typeface="Calibri" panose="020F0502020204030204" pitchFamily="34" charset="0"/>
+                <a:cs typeface="Times New Roman" panose="02020603050405020304" pitchFamily="18" charset="0"/>
+              </a:rPr>
+              <a:t>An alternative to REST, </a:t>
+            </a:r>
+            <a:r>
+              <a:rPr lang="en-US" sz="1800" kern="100" dirty="0" err="1">
+                <a:effectLst/>
+                <a:latin typeface="Calibri" panose="020F0502020204030204" pitchFamily="34" charset="0"/>
+                <a:ea typeface="Calibri" panose="020F0502020204030204" pitchFamily="34" charset="0"/>
+                <a:cs typeface="Times New Roman" panose="02020603050405020304" pitchFamily="18" charset="0"/>
+              </a:rPr>
+              <a:t>GraphQL</a:t>
+            </a:r>
+            <a:r>
+              <a:rPr lang="en-US" sz="1800" kern="100" dirty="0">
+                <a:effectLst/>
+                <a:latin typeface="Calibri" panose="020F0502020204030204" pitchFamily="34" charset="0"/>
+                <a:ea typeface="Calibri" panose="020F0502020204030204" pitchFamily="34" charset="0"/>
+                <a:cs typeface="Times New Roman" panose="02020603050405020304" pitchFamily="18" charset="0"/>
+              </a:rPr>
+              <a:t> allows clients to request only the data they need, potentially reducing the amount of data transferred over the network.</a:t>
+            </a:r>
+          </a:p>
+          <a:p>
+            <a:pPr marL="0" marR="0">
+              <a:lnSpc>
+                <a:spcPct val="150000"/>
+              </a:lnSpc>
+              <a:spcBef>
+                <a:spcPts val="0"/>
+              </a:spcBef>
+              <a:spcAft>
+                <a:spcPts val="800"/>
+              </a:spcAft>
+            </a:pPr>
+            <a:r>
+              <a:rPr lang="en-US" sz="1800" b="1" kern="100" dirty="0" err="1">
+                <a:effectLst/>
+                <a:latin typeface="Calibri" panose="020F0502020204030204" pitchFamily="34" charset="0"/>
+                <a:ea typeface="Calibri" panose="020F0502020204030204" pitchFamily="34" charset="0"/>
+                <a:cs typeface="Times New Roman" panose="02020603050405020304" pitchFamily="18" charset="0"/>
+              </a:rPr>
+              <a:t>gRPC</a:t>
+            </a:r>
+            <a:r>
+              <a:rPr lang="en-US" sz="1800" b="1" kern="100" dirty="0">
+                <a:effectLst/>
+                <a:latin typeface="Calibri" panose="020F0502020204030204" pitchFamily="34" charset="0"/>
+                <a:ea typeface="Calibri" panose="020F0502020204030204" pitchFamily="34" charset="0"/>
+                <a:cs typeface="Times New Roman" panose="02020603050405020304" pitchFamily="18" charset="0"/>
+              </a:rPr>
+              <a:t>:</a:t>
+            </a:r>
+            <a:endParaRPr lang="en-US" sz="1800" kern="100" dirty="0">
+              <a:effectLst/>
+              <a:latin typeface="Calibri" panose="020F0502020204030204" pitchFamily="34" charset="0"/>
+              <a:ea typeface="Calibri" panose="020F0502020204030204" pitchFamily="34" charset="0"/>
+              <a:cs typeface="Times New Roman" panose="02020603050405020304" pitchFamily="18" charset="0"/>
+            </a:endParaRPr>
+          </a:p>
+          <a:p>
+            <a:pPr marL="0" marR="0">
+              <a:lnSpc>
+                <a:spcPct val="150000"/>
+              </a:lnSpc>
+              <a:spcBef>
+                <a:spcPts val="0"/>
+              </a:spcBef>
+              <a:spcAft>
+                <a:spcPts val="800"/>
+              </a:spcAft>
+            </a:pPr>
+            <a:r>
+              <a:rPr lang="en-US" sz="1800" kern="100" dirty="0">
+                <a:effectLst/>
+                <a:latin typeface="Calibri" panose="020F0502020204030204" pitchFamily="34" charset="0"/>
+                <a:ea typeface="Calibri" panose="020F0502020204030204" pitchFamily="34" charset="0"/>
+                <a:cs typeface="Times New Roman" panose="02020603050405020304" pitchFamily="18" charset="0"/>
+              </a:rPr>
+              <a:t>A high-performance, open-source framework developed by Google. It uses HTTP/2 for transport, Protocol Buffers as the serialization format, and it allows for bidirectional streaming of requests and responses.</a:t>
+            </a:r>
+          </a:p>
+          <a:p>
+            <a:pPr marL="0" marR="0">
+              <a:lnSpc>
+                <a:spcPct val="150000"/>
+              </a:lnSpc>
+              <a:spcBef>
+                <a:spcPts val="0"/>
+              </a:spcBef>
+              <a:spcAft>
+                <a:spcPts val="800"/>
+              </a:spcAft>
+            </a:pPr>
+            <a:r>
+              <a:rPr lang="en-US" sz="1800" b="1" kern="100" dirty="0">
+                <a:effectLst/>
+                <a:latin typeface="Calibri" panose="020F0502020204030204" pitchFamily="34" charset="0"/>
+                <a:ea typeface="Calibri" panose="020F0502020204030204" pitchFamily="34" charset="0"/>
+                <a:cs typeface="Times New Roman" panose="02020603050405020304" pitchFamily="18" charset="0"/>
+              </a:rPr>
+              <a:t>SOAP (Simple Object Access Protocol):</a:t>
+            </a:r>
+            <a:endParaRPr lang="en-US" sz="1800" kern="100" dirty="0">
+              <a:effectLst/>
+              <a:latin typeface="Calibri" panose="020F0502020204030204" pitchFamily="34" charset="0"/>
+              <a:ea typeface="Calibri" panose="020F0502020204030204" pitchFamily="34" charset="0"/>
+              <a:cs typeface="Times New Roman" panose="02020603050405020304" pitchFamily="18" charset="0"/>
+            </a:endParaRPr>
+          </a:p>
+          <a:p>
+            <a:pPr marL="0" marR="0">
+              <a:lnSpc>
+                <a:spcPct val="150000"/>
+              </a:lnSpc>
+              <a:spcBef>
+                <a:spcPts val="0"/>
+              </a:spcBef>
+              <a:spcAft>
+                <a:spcPts val="800"/>
+              </a:spcAft>
+            </a:pPr>
+            <a:r>
+              <a:rPr lang="en-US" sz="1800" kern="100" dirty="0">
+                <a:effectLst/>
+                <a:latin typeface="Calibri" panose="020F0502020204030204" pitchFamily="34" charset="0"/>
+                <a:ea typeface="Calibri" panose="020F0502020204030204" pitchFamily="34" charset="0"/>
+                <a:cs typeface="Times New Roman" panose="02020603050405020304" pitchFamily="18" charset="0"/>
+              </a:rPr>
+              <a:t>An older standard for designing APIs. SOAP APIs are characterized by XML-based messages, strict schemas, and operations.</a:t>
+            </a:r>
+          </a:p>
+          <a:p>
+            <a:pPr marL="0" marR="0">
+              <a:lnSpc>
+                <a:spcPct val="150000"/>
+              </a:lnSpc>
+              <a:spcBef>
+                <a:spcPts val="0"/>
+              </a:spcBef>
+              <a:spcAft>
+                <a:spcPts val="800"/>
+              </a:spcAft>
+            </a:pPr>
+            <a:r>
+              <a:rPr lang="en-US" sz="1800" b="1" kern="100" dirty="0">
+                <a:effectLst/>
+                <a:latin typeface="Calibri" panose="020F0502020204030204" pitchFamily="34" charset="0"/>
+                <a:ea typeface="Calibri" panose="020F0502020204030204" pitchFamily="34" charset="0"/>
+                <a:cs typeface="Times New Roman" panose="02020603050405020304" pitchFamily="18" charset="0"/>
+              </a:rPr>
+              <a:t>OData (Open Data Protocol):</a:t>
+            </a:r>
+            <a:endParaRPr lang="en-US" sz="1800" kern="100" dirty="0">
+              <a:effectLst/>
+              <a:latin typeface="Calibri" panose="020F0502020204030204" pitchFamily="34" charset="0"/>
+              <a:ea typeface="Calibri" panose="020F0502020204030204" pitchFamily="34" charset="0"/>
+              <a:cs typeface="Times New Roman" panose="02020603050405020304" pitchFamily="18" charset="0"/>
+            </a:endParaRPr>
+          </a:p>
+          <a:p>
+            <a:pPr marL="0" marR="0">
+              <a:lnSpc>
+                <a:spcPct val="150000"/>
+              </a:lnSpc>
+              <a:spcBef>
+                <a:spcPts val="0"/>
+              </a:spcBef>
+              <a:spcAft>
+                <a:spcPts val="800"/>
+              </a:spcAft>
+            </a:pPr>
+            <a:r>
+              <a:rPr lang="en-US" sz="1800" kern="100" dirty="0">
+                <a:effectLst/>
+                <a:latin typeface="Calibri" panose="020F0502020204030204" pitchFamily="34" charset="0"/>
+                <a:ea typeface="Calibri" panose="020F0502020204030204" pitchFamily="34" charset="0"/>
+                <a:cs typeface="Times New Roman" panose="02020603050405020304" pitchFamily="18" charset="0"/>
+              </a:rPr>
+              <a:t>A protocol that allows the creation and consumption of </a:t>
+            </a:r>
+            <a:r>
+              <a:rPr lang="en-US" sz="1800" kern="100" dirty="0" err="1">
+                <a:effectLst/>
+                <a:latin typeface="Calibri" panose="020F0502020204030204" pitchFamily="34" charset="0"/>
+                <a:ea typeface="Calibri" panose="020F0502020204030204" pitchFamily="34" charset="0"/>
+                <a:cs typeface="Times New Roman" panose="02020603050405020304" pitchFamily="18" charset="0"/>
+              </a:rPr>
+              <a:t>queryable</a:t>
+            </a:r>
+            <a:r>
+              <a:rPr lang="en-US" sz="1800" kern="100" dirty="0">
+                <a:effectLst/>
+                <a:latin typeface="Calibri" panose="020F0502020204030204" pitchFamily="34" charset="0"/>
+                <a:ea typeface="Calibri" panose="020F0502020204030204" pitchFamily="34" charset="0"/>
+                <a:cs typeface="Times New Roman" panose="02020603050405020304" pitchFamily="18" charset="0"/>
+              </a:rPr>
+              <a:t> and interoperable RESTful APIs. We used OData for our Inventory cycle counting and work order processing at our plant.</a:t>
+            </a:r>
+          </a:p>
+          <a:p>
+            <a:endParaRPr lang="en-US" dirty="0"/>
+          </a:p>
+        </p:txBody>
+      </p:sp>
+      <p:sp>
+        <p:nvSpPr>
+          <p:cNvPr id="4" name="Slide Number Placeholder 3"/>
+          <p:cNvSpPr>
+            <a:spLocks noGrp="1"/>
+          </p:cNvSpPr>
+          <p:nvPr>
+            <p:ph type="sldNum" sz="quarter" idx="5"/>
+          </p:nvPr>
+        </p:nvSpPr>
+        <p:spPr/>
+        <p:txBody>
+          <a:bodyPr/>
+          <a:lstStyle/>
+          <a:p>
+            <a:fld id="{9DCE2504-C28B-4080-B704-27D98903179C}" type="slidenum">
+              <a:rPr lang="en-US" smtClean="0"/>
+              <a:t>2</a:t>
+            </a:fld>
+            <a:endParaRPr lang="en-US"/>
+          </a:p>
+        </p:txBody>
+      </p:sp>
+    </p:spTree>
+    <p:extLst>
+      <p:ext uri="{BB962C8B-B14F-4D97-AF65-F5344CB8AC3E}">
+        <p14:creationId xmlns:p14="http://schemas.microsoft.com/office/powerpoint/2010/main" val="144497501"/>
+      </p:ext>
+    </p:extLst>
+  </p:cSld>
+  <p:clrMapOvr>
+    <a:masterClrMapping/>
+  </p:clrMapOvr>
+</p:notes>
+</file>
+
+<file path=ppt/notesSlides/notesSlide10.xml><?xml version="1.0" encoding="utf-8"?>
+<p:notes xmlns:a="http://schemas.openxmlformats.org/drawingml/2006/main" xmlns:r="http://schemas.openxmlformats.org/officeDocument/2006/relationships" xmlns:p="http://schemas.openxmlformats.org/presentationml/2006/main">
+  <p:cSld>
+    <p:spTree>
+      <p:nvGrpSpPr>
+        <p:cNvPr id="1" name=""/>
+        <p:cNvGrpSpPr/>
+        <p:nvPr/>
+      </p:nvGrpSpPr>
+      <p:grpSpPr>
+        <a:xfrm>
+          <a:off x="0" y="0"/>
+          <a:ext cx="0" cy="0"/>
+          <a:chOff x="0" y="0"/>
+          <a:chExt cx="0" cy="0"/>
+        </a:xfrm>
+      </p:grpSpPr>
+      <p:sp>
+        <p:nvSpPr>
+          <p:cNvPr id="2" name="Slide Image Placeholder 1"/>
+          <p:cNvSpPr>
+            <a:spLocks noGrp="1" noRot="1" noChangeAspect="1"/>
+          </p:cNvSpPr>
+          <p:nvPr>
+            <p:ph type="sldImg"/>
+          </p:nvPr>
+        </p:nvSpPr>
+        <p:spPr/>
+      </p:sp>
+      <p:sp>
+        <p:nvSpPr>
+          <p:cNvPr id="3" name="Notes Placeholder 2"/>
+          <p:cNvSpPr>
+            <a:spLocks noGrp="1"/>
+          </p:cNvSpPr>
+          <p:nvPr>
+            <p:ph type="body" idx="1"/>
+          </p:nvPr>
+        </p:nvSpPr>
+        <p:spPr/>
+        <p:txBody>
+          <a:bodyPr/>
+          <a:lstStyle/>
+          <a:p>
+            <a:r>
+              <a:rPr lang="en-US" dirty="0"/>
+              <a:t>Another is </a:t>
+            </a:r>
+            <a:r>
+              <a:rPr lang="en-US" dirty="0" err="1"/>
+              <a:t>APINinja</a:t>
+            </a:r>
+            <a:r>
+              <a:rPr lang="en-US" dirty="0"/>
+              <a:t> making use of their weather API specifically, but they have a verity of </a:t>
+            </a:r>
+            <a:r>
+              <a:rPr lang="en-US" dirty="0" err="1"/>
+              <a:t>api’s</a:t>
+            </a:r>
+            <a:r>
+              <a:rPr lang="en-US" dirty="0"/>
+              <a:t> to choose from. </a:t>
+            </a:r>
+          </a:p>
+          <a:p>
+            <a:r>
+              <a:rPr lang="en-US" dirty="0"/>
+              <a:t>One can see the JSON which is returned with information for the area, along with the Information being relayed to the DOM. </a:t>
+            </a:r>
+          </a:p>
+          <a:p>
+            <a:endParaRPr lang="en-US" dirty="0"/>
+          </a:p>
+        </p:txBody>
+      </p:sp>
+      <p:sp>
+        <p:nvSpPr>
+          <p:cNvPr id="4" name="Slide Number Placeholder 3"/>
+          <p:cNvSpPr>
+            <a:spLocks noGrp="1"/>
+          </p:cNvSpPr>
+          <p:nvPr>
+            <p:ph type="sldNum" sz="quarter" idx="5"/>
+          </p:nvPr>
+        </p:nvSpPr>
+        <p:spPr/>
+        <p:txBody>
+          <a:bodyPr/>
+          <a:lstStyle/>
+          <a:p>
+            <a:fld id="{9DCE2504-C28B-4080-B704-27D98903179C}" type="slidenum">
+              <a:rPr lang="en-US" smtClean="0"/>
+              <a:t>11</a:t>
+            </a:fld>
+            <a:endParaRPr lang="en-US"/>
+          </a:p>
+        </p:txBody>
+      </p:sp>
+    </p:spTree>
+    <p:extLst>
+      <p:ext uri="{BB962C8B-B14F-4D97-AF65-F5344CB8AC3E}">
+        <p14:creationId xmlns:p14="http://schemas.microsoft.com/office/powerpoint/2010/main" val="3895227214"/>
+      </p:ext>
+    </p:extLst>
+  </p:cSld>
+  <p:clrMapOvr>
+    <a:masterClrMapping/>
+  </p:clrMapOvr>
+</p:notes>
+</file>
+
+<file path=ppt/notesSlides/notesSlide11.xml><?xml version="1.0" encoding="utf-8"?>
+<p:notes xmlns:a="http://schemas.openxmlformats.org/drawingml/2006/main" xmlns:r="http://schemas.openxmlformats.org/officeDocument/2006/relationships" xmlns:p="http://schemas.openxmlformats.org/presentationml/2006/main">
+  <p:cSld>
+    <p:spTree>
+      <p:nvGrpSpPr>
+        <p:cNvPr id="1" name=""/>
+        <p:cNvGrpSpPr/>
+        <p:nvPr/>
+      </p:nvGrpSpPr>
+      <p:grpSpPr>
+        <a:xfrm>
+          <a:off x="0" y="0"/>
+          <a:ext cx="0" cy="0"/>
+          <a:chOff x="0" y="0"/>
+          <a:chExt cx="0" cy="0"/>
+        </a:xfrm>
+      </p:grpSpPr>
+      <p:sp>
+        <p:nvSpPr>
+          <p:cNvPr id="2" name="Slide Image Placeholder 1"/>
+          <p:cNvSpPr>
+            <a:spLocks noGrp="1" noRot="1" noChangeAspect="1"/>
+          </p:cNvSpPr>
+          <p:nvPr>
+            <p:ph type="sldImg"/>
+          </p:nvPr>
+        </p:nvSpPr>
+        <p:spPr/>
+      </p:sp>
+      <p:sp>
+        <p:nvSpPr>
+          <p:cNvPr id="3" name="Notes Placeholder 2"/>
+          <p:cNvSpPr>
+            <a:spLocks noGrp="1"/>
+          </p:cNvSpPr>
+          <p:nvPr>
+            <p:ph type="body" idx="1"/>
+          </p:nvPr>
+        </p:nvSpPr>
+        <p:spPr/>
+        <p:txBody>
+          <a:bodyPr/>
+          <a:lstStyle/>
+          <a:p>
+            <a:r>
+              <a:rPr lang="en-US" dirty="0"/>
+              <a:t>Here is the Java Script I used for this with my redacted API KEY</a:t>
+            </a:r>
+          </a:p>
+          <a:p>
+            <a:r>
+              <a:rPr lang="en-US" dirty="0"/>
+              <a:t>Another API call is the local cache </a:t>
+            </a:r>
+            <a:r>
+              <a:rPr lang="en-US" dirty="0" err="1"/>
+              <a:t>stprage</a:t>
+            </a:r>
+            <a:r>
+              <a:rPr lang="en-US" dirty="0"/>
+              <a:t> which we have recently used to retain information in reference to last visit and number of visits.</a:t>
+            </a:r>
+          </a:p>
+          <a:p>
+            <a:endParaRPr lang="en-US" dirty="0"/>
+          </a:p>
+        </p:txBody>
+      </p:sp>
+      <p:sp>
+        <p:nvSpPr>
+          <p:cNvPr id="4" name="Slide Number Placeholder 3"/>
+          <p:cNvSpPr>
+            <a:spLocks noGrp="1"/>
+          </p:cNvSpPr>
+          <p:nvPr>
+            <p:ph type="sldNum" sz="quarter" idx="5"/>
+          </p:nvPr>
+        </p:nvSpPr>
+        <p:spPr/>
+        <p:txBody>
+          <a:bodyPr/>
+          <a:lstStyle/>
+          <a:p>
+            <a:fld id="{9DCE2504-C28B-4080-B704-27D98903179C}" type="slidenum">
+              <a:rPr lang="en-US" smtClean="0"/>
+              <a:t>12</a:t>
+            </a:fld>
+            <a:endParaRPr lang="en-US"/>
+          </a:p>
+        </p:txBody>
+      </p:sp>
+    </p:spTree>
+    <p:extLst>
+      <p:ext uri="{BB962C8B-B14F-4D97-AF65-F5344CB8AC3E}">
+        <p14:creationId xmlns:p14="http://schemas.microsoft.com/office/powerpoint/2010/main" val="3115879711"/>
+      </p:ext>
+    </p:extLst>
+  </p:cSld>
+  <p:clrMapOvr>
+    <a:masterClrMapping/>
+  </p:clrMapOvr>
+</p:notes>
+</file>
+
+<file path=ppt/notesSlides/notesSlide2.xml><?xml version="1.0" encoding="utf-8"?>
+<p:notes xmlns:a="http://schemas.openxmlformats.org/drawingml/2006/main" xmlns:r="http://schemas.openxmlformats.org/officeDocument/2006/relationships" xmlns:p="http://schemas.openxmlformats.org/presentationml/2006/main">
+  <p:cSld>
+    <p:spTree>
+      <p:nvGrpSpPr>
+        <p:cNvPr id="1" name=""/>
+        <p:cNvGrpSpPr/>
+        <p:nvPr/>
+      </p:nvGrpSpPr>
+      <p:grpSpPr>
+        <a:xfrm>
+          <a:off x="0" y="0"/>
+          <a:ext cx="0" cy="0"/>
+          <a:chOff x="0" y="0"/>
+          <a:chExt cx="0" cy="0"/>
+        </a:xfrm>
+      </p:grpSpPr>
+      <p:sp>
+        <p:nvSpPr>
+          <p:cNvPr id="2" name="Slide Image Placeholder 1"/>
+          <p:cNvSpPr>
+            <a:spLocks noGrp="1" noRot="1" noChangeAspect="1"/>
+          </p:cNvSpPr>
+          <p:nvPr>
+            <p:ph type="sldImg"/>
+          </p:nvPr>
+        </p:nvSpPr>
+        <p:spPr/>
+      </p:sp>
+      <p:sp>
+        <p:nvSpPr>
+          <p:cNvPr id="3" name="Notes Placeholder 2"/>
+          <p:cNvSpPr>
+            <a:spLocks noGrp="1"/>
+          </p:cNvSpPr>
+          <p:nvPr>
+            <p:ph type="body" idx="1"/>
+          </p:nvPr>
+        </p:nvSpPr>
+        <p:spPr/>
+        <p:txBody>
+          <a:bodyPr/>
+          <a:lstStyle/>
+          <a:p>
+            <a:pPr marL="0" marR="0" lvl="0" indent="0" algn="l" defTabSz="914400" rtl="0" eaLnBrk="1" fontAlgn="auto" latinLnBrk="0" hangingPunct="1">
+              <a:lnSpc>
+                <a:spcPct val="100000"/>
+              </a:lnSpc>
+              <a:spcBef>
+                <a:spcPts val="0"/>
+              </a:spcBef>
+              <a:spcAft>
+                <a:spcPts val="0"/>
+              </a:spcAft>
+              <a:buClrTx/>
+              <a:buSzTx/>
+              <a:buFontTx/>
+              <a:buNone/>
+              <a:tabLst/>
+              <a:defRPr/>
+            </a:pPr>
+            <a:r>
+              <a:rPr lang="en-US" sz="1800" kern="100" dirty="0">
+                <a:effectLst/>
+                <a:latin typeface="Calibri" panose="020F0502020204030204" pitchFamily="34" charset="0"/>
+                <a:ea typeface="Calibri" panose="020F0502020204030204" pitchFamily="34" charset="0"/>
+                <a:cs typeface="Times New Roman" panose="02020603050405020304" pitchFamily="18" charset="0"/>
+              </a:rPr>
+              <a:t>One of the most widely used Models is what we will concentrate on.</a:t>
+            </a:r>
+          </a:p>
+          <a:p>
+            <a:endParaRPr lang="en-US" dirty="0"/>
+          </a:p>
+          <a:p>
+            <a:pPr marL="0" marR="0">
+              <a:lnSpc>
+                <a:spcPct val="150000"/>
+              </a:lnSpc>
+              <a:spcBef>
+                <a:spcPts val="0"/>
+              </a:spcBef>
+              <a:spcAft>
+                <a:spcPts val="800"/>
+              </a:spcAft>
+            </a:pPr>
+            <a:r>
+              <a:rPr lang="en-US" sz="1800" b="1" kern="100" dirty="0">
+                <a:effectLst/>
+                <a:latin typeface="Calibri" panose="020F0502020204030204" pitchFamily="34" charset="0"/>
+                <a:ea typeface="Calibri" panose="020F0502020204030204" pitchFamily="34" charset="0"/>
+                <a:cs typeface="Times New Roman" panose="02020603050405020304" pitchFamily="18" charset="0"/>
+              </a:rPr>
+              <a:t>HTTP RESTful API’s</a:t>
+            </a:r>
+            <a:endParaRPr lang="en-US" sz="1800" kern="100" dirty="0">
+              <a:effectLst/>
+              <a:latin typeface="Calibri" panose="020F0502020204030204" pitchFamily="34" charset="0"/>
+              <a:ea typeface="Calibri" panose="020F0502020204030204" pitchFamily="34" charset="0"/>
+              <a:cs typeface="Times New Roman" panose="02020603050405020304" pitchFamily="18" charset="0"/>
+            </a:endParaRPr>
+          </a:p>
+          <a:p>
+            <a:pPr marL="0" marR="0">
+              <a:lnSpc>
+                <a:spcPct val="150000"/>
+              </a:lnSpc>
+              <a:spcBef>
+                <a:spcPts val="0"/>
+              </a:spcBef>
+              <a:spcAft>
+                <a:spcPts val="800"/>
+              </a:spcAft>
+            </a:pPr>
+            <a:r>
+              <a:rPr lang="en-US" sz="1800" kern="100" dirty="0">
+                <a:effectLst/>
+                <a:latin typeface="Calibri" panose="020F0502020204030204" pitchFamily="34" charset="0"/>
+                <a:ea typeface="Calibri" panose="020F0502020204030204" pitchFamily="34" charset="0"/>
+                <a:cs typeface="Times New Roman" panose="02020603050405020304" pitchFamily="18" charset="0"/>
+              </a:rPr>
+              <a:t> </a:t>
+            </a:r>
+          </a:p>
+          <a:p>
+            <a:pPr marL="0" marR="0">
+              <a:lnSpc>
+                <a:spcPct val="150000"/>
+              </a:lnSpc>
+              <a:spcBef>
+                <a:spcPts val="0"/>
+              </a:spcBef>
+              <a:spcAft>
+                <a:spcPts val="800"/>
+              </a:spcAft>
+            </a:pPr>
+            <a:r>
+              <a:rPr lang="en-US" sz="1800" kern="100" dirty="0">
+                <a:effectLst/>
+                <a:latin typeface="Calibri" panose="020F0502020204030204" pitchFamily="34" charset="0"/>
+                <a:ea typeface="Calibri" panose="020F0502020204030204" pitchFamily="34" charset="0"/>
+                <a:cs typeface="Times New Roman" panose="02020603050405020304" pitchFamily="18" charset="0"/>
+              </a:rPr>
+              <a:t>Here are some of the benefits of this format:</a:t>
+            </a:r>
+            <a:br>
+              <a:rPr lang="en-US" sz="1800" kern="100" dirty="0">
+                <a:effectLst/>
+                <a:latin typeface="Calibri" panose="020F0502020204030204" pitchFamily="34" charset="0"/>
+                <a:ea typeface="Calibri" panose="020F0502020204030204" pitchFamily="34" charset="0"/>
+                <a:cs typeface="Times New Roman" panose="02020603050405020304" pitchFamily="18" charset="0"/>
+              </a:rPr>
+            </a:br>
+            <a:r>
+              <a:rPr lang="en-US" sz="1800" kern="100" dirty="0">
+                <a:effectLst/>
+                <a:latin typeface="Calibri" panose="020F0502020204030204" pitchFamily="34" charset="0"/>
+                <a:ea typeface="Calibri" panose="020F0502020204030204" pitchFamily="34" charset="0"/>
+                <a:cs typeface="Times New Roman" panose="02020603050405020304" pitchFamily="18" charset="0"/>
+              </a:rPr>
+              <a:t>	Communication standard – the connectivity between the server and the clients are regulated through the HTTP process. </a:t>
+            </a:r>
+          </a:p>
+          <a:p>
+            <a:pPr marL="0" marR="0">
+              <a:lnSpc>
+                <a:spcPct val="150000"/>
+              </a:lnSpc>
+              <a:spcBef>
+                <a:spcPts val="0"/>
+              </a:spcBef>
+              <a:spcAft>
+                <a:spcPts val="800"/>
+              </a:spcAft>
+            </a:pPr>
+            <a:r>
+              <a:rPr lang="en-US" sz="1800" kern="100" dirty="0">
+                <a:effectLst/>
+                <a:latin typeface="Calibri" panose="020F0502020204030204" pitchFamily="34" charset="0"/>
+                <a:ea typeface="Calibri" panose="020F0502020204030204" pitchFamily="34" charset="0"/>
+                <a:cs typeface="Times New Roman" panose="02020603050405020304" pitchFamily="18" charset="0"/>
+              </a:rPr>
+              <a:t>	Scalability – A large number of clients can use this process because it is HTTP socket based.</a:t>
+            </a:r>
+          </a:p>
+          <a:p>
+            <a:pPr marL="0" marR="0">
+              <a:lnSpc>
+                <a:spcPct val="150000"/>
+              </a:lnSpc>
+              <a:spcBef>
+                <a:spcPts val="0"/>
+              </a:spcBef>
+              <a:spcAft>
+                <a:spcPts val="800"/>
+              </a:spcAft>
+            </a:pPr>
+            <a:r>
+              <a:rPr lang="en-US" sz="1800" kern="100" dirty="0">
+                <a:effectLst/>
+                <a:latin typeface="Calibri" panose="020F0502020204030204" pitchFamily="34" charset="0"/>
+                <a:ea typeface="Calibri" panose="020F0502020204030204" pitchFamily="34" charset="0"/>
+                <a:cs typeface="Times New Roman" panose="02020603050405020304" pitchFamily="18" charset="0"/>
+              </a:rPr>
+              <a:t>	Platform Agnostic: Used across different devices and platforms, including some programming languages.</a:t>
+            </a:r>
+          </a:p>
+          <a:p>
+            <a:pPr marL="0" marR="0">
+              <a:lnSpc>
+                <a:spcPct val="150000"/>
+              </a:lnSpc>
+              <a:spcBef>
+                <a:spcPts val="0"/>
+              </a:spcBef>
+              <a:spcAft>
+                <a:spcPts val="800"/>
+              </a:spcAft>
+            </a:pPr>
+            <a:r>
+              <a:rPr lang="en-US" sz="1800" kern="100" dirty="0">
+                <a:effectLst/>
+                <a:latin typeface="Calibri" panose="020F0502020204030204" pitchFamily="34" charset="0"/>
+                <a:ea typeface="Calibri" panose="020F0502020204030204" pitchFamily="34" charset="0"/>
+                <a:cs typeface="Times New Roman" panose="02020603050405020304" pitchFamily="18" charset="0"/>
+              </a:rPr>
+              <a:t>	Decoupled Development: since it is single side development being the client side is HTTP standard connectivity, then the developer of the API can easily develop or modify content.</a:t>
+            </a:r>
+          </a:p>
+          <a:p>
+            <a:pPr marL="0" marR="0">
+              <a:lnSpc>
+                <a:spcPct val="150000"/>
+              </a:lnSpc>
+              <a:spcBef>
+                <a:spcPts val="0"/>
+              </a:spcBef>
+              <a:spcAft>
+                <a:spcPts val="800"/>
+              </a:spcAft>
+            </a:pPr>
+            <a:r>
+              <a:rPr lang="en-US" sz="1800" kern="100" dirty="0">
+                <a:effectLst/>
+                <a:latin typeface="Calibri" panose="020F0502020204030204" pitchFamily="34" charset="0"/>
+                <a:ea typeface="Calibri" panose="020F0502020204030204" pitchFamily="34" charset="0"/>
+                <a:cs typeface="Times New Roman" panose="02020603050405020304" pitchFamily="18" charset="0"/>
+              </a:rPr>
+              <a:t> </a:t>
+            </a:r>
+          </a:p>
+          <a:p>
+            <a:pPr marL="0" marR="0">
+              <a:lnSpc>
+                <a:spcPct val="150000"/>
+              </a:lnSpc>
+              <a:spcBef>
+                <a:spcPts val="0"/>
+              </a:spcBef>
+              <a:spcAft>
+                <a:spcPts val="800"/>
+              </a:spcAft>
+            </a:pPr>
+            <a:r>
+              <a:rPr lang="en-US" sz="1800" b="1" kern="100" dirty="0">
+                <a:effectLst/>
+                <a:latin typeface="Calibri" panose="020F0502020204030204" pitchFamily="34" charset="0"/>
+                <a:ea typeface="Calibri" panose="020F0502020204030204" pitchFamily="34" charset="0"/>
+                <a:cs typeface="Times New Roman" panose="02020603050405020304" pitchFamily="18" charset="0"/>
+              </a:rPr>
+              <a:t>There are several data formats available:</a:t>
+            </a:r>
+            <a:endParaRPr lang="en-US" sz="1800" kern="100" dirty="0">
+              <a:effectLst/>
+              <a:latin typeface="Calibri" panose="020F0502020204030204" pitchFamily="34" charset="0"/>
+              <a:ea typeface="Calibri" panose="020F0502020204030204" pitchFamily="34" charset="0"/>
+              <a:cs typeface="Times New Roman" panose="02020603050405020304" pitchFamily="18" charset="0"/>
+            </a:endParaRPr>
+          </a:p>
+          <a:p>
+            <a:pPr marL="0" marR="0">
+              <a:lnSpc>
+                <a:spcPct val="150000"/>
+              </a:lnSpc>
+              <a:spcBef>
+                <a:spcPts val="0"/>
+              </a:spcBef>
+              <a:spcAft>
+                <a:spcPts val="800"/>
+              </a:spcAft>
+            </a:pPr>
+            <a:r>
+              <a:rPr lang="en-US" sz="1800" kern="100" dirty="0">
+                <a:effectLst/>
+                <a:latin typeface="Calibri" panose="020F0502020204030204" pitchFamily="34" charset="0"/>
+                <a:ea typeface="Calibri" panose="020F0502020204030204" pitchFamily="34" charset="0"/>
+                <a:cs typeface="Times New Roman" panose="02020603050405020304" pitchFamily="18" charset="0"/>
+              </a:rPr>
+              <a:t>JSON or (JavaScript Object Notation) seems to be the most prevalent of all that I have used.</a:t>
+            </a:r>
+          </a:p>
+          <a:p>
+            <a:pPr marL="0" marR="0">
+              <a:lnSpc>
+                <a:spcPct val="150000"/>
+              </a:lnSpc>
+              <a:spcBef>
+                <a:spcPts val="0"/>
+              </a:spcBef>
+              <a:spcAft>
+                <a:spcPts val="800"/>
+              </a:spcAft>
+            </a:pPr>
+            <a:r>
+              <a:rPr lang="en-US" sz="1800" kern="100" dirty="0">
+                <a:effectLst/>
+                <a:latin typeface="Calibri" panose="020F0502020204030204" pitchFamily="34" charset="0"/>
+                <a:ea typeface="Calibri" panose="020F0502020204030204" pitchFamily="34" charset="0"/>
+                <a:cs typeface="Times New Roman" panose="02020603050405020304" pitchFamily="18" charset="0"/>
+              </a:rPr>
+              <a:t>XML or (</a:t>
+            </a:r>
+            <a:r>
+              <a:rPr lang="en-US" sz="1800" kern="100" dirty="0" err="1">
+                <a:effectLst/>
+                <a:latin typeface="Calibri" panose="020F0502020204030204" pitchFamily="34" charset="0"/>
+                <a:ea typeface="Calibri" panose="020F0502020204030204" pitchFamily="34" charset="0"/>
+                <a:cs typeface="Times New Roman" panose="02020603050405020304" pitchFamily="18" charset="0"/>
+              </a:rPr>
+              <a:t>eXtensible</a:t>
+            </a:r>
+            <a:r>
+              <a:rPr lang="en-US" sz="1800" kern="100" dirty="0">
+                <a:effectLst/>
+                <a:latin typeface="Calibri" panose="020F0502020204030204" pitchFamily="34" charset="0"/>
+                <a:ea typeface="Calibri" panose="020F0502020204030204" pitchFamily="34" charset="0"/>
+                <a:cs typeface="Times New Roman" panose="02020603050405020304" pitchFamily="18" charset="0"/>
+              </a:rPr>
+              <a:t> Mark up Language): is a cross between human and machine readable</a:t>
+            </a:r>
+          </a:p>
+          <a:p>
+            <a:pPr marL="0" marR="0">
+              <a:lnSpc>
+                <a:spcPct val="150000"/>
+              </a:lnSpc>
+              <a:spcBef>
+                <a:spcPts val="0"/>
+              </a:spcBef>
+              <a:spcAft>
+                <a:spcPts val="800"/>
+              </a:spcAft>
+            </a:pPr>
+            <a:r>
+              <a:rPr lang="en-US" sz="1800" kern="100" dirty="0">
+                <a:effectLst/>
+                <a:latin typeface="Calibri" panose="020F0502020204030204" pitchFamily="34" charset="0"/>
+                <a:ea typeface="Calibri" panose="020F0502020204030204" pitchFamily="34" charset="0"/>
+                <a:cs typeface="Times New Roman" panose="02020603050405020304" pitchFamily="18" charset="0"/>
+              </a:rPr>
+              <a:t>The two less common formats are HTML which builds an entire functional webpage out of the data, and YAML which is usually for Human Readable outputs</a:t>
+            </a:r>
+          </a:p>
+          <a:p>
+            <a:endParaRPr lang="en-US" dirty="0"/>
+          </a:p>
+        </p:txBody>
+      </p:sp>
+      <p:sp>
+        <p:nvSpPr>
+          <p:cNvPr id="4" name="Slide Number Placeholder 3"/>
+          <p:cNvSpPr>
+            <a:spLocks noGrp="1"/>
+          </p:cNvSpPr>
+          <p:nvPr>
+            <p:ph type="sldNum" sz="quarter" idx="5"/>
+          </p:nvPr>
+        </p:nvSpPr>
+        <p:spPr/>
+        <p:txBody>
+          <a:bodyPr/>
+          <a:lstStyle/>
+          <a:p>
+            <a:fld id="{9DCE2504-C28B-4080-B704-27D98903179C}" type="slidenum">
+              <a:rPr lang="en-US" smtClean="0"/>
+              <a:t>3</a:t>
+            </a:fld>
+            <a:endParaRPr lang="en-US"/>
+          </a:p>
+        </p:txBody>
+      </p:sp>
+    </p:spTree>
+    <p:extLst>
+      <p:ext uri="{BB962C8B-B14F-4D97-AF65-F5344CB8AC3E}">
+        <p14:creationId xmlns:p14="http://schemas.microsoft.com/office/powerpoint/2010/main" val="380371866"/>
+      </p:ext>
+    </p:extLst>
+  </p:cSld>
+  <p:clrMapOvr>
+    <a:masterClrMapping/>
+  </p:clrMapOvr>
+</p:notes>
+</file>
+
+<file path=ppt/notesSlides/notesSlide3.xml><?xml version="1.0" encoding="utf-8"?>
+<p:notes xmlns:a="http://schemas.openxmlformats.org/drawingml/2006/main" xmlns:r="http://schemas.openxmlformats.org/officeDocument/2006/relationships" xmlns:p="http://schemas.openxmlformats.org/presentationml/2006/main">
+  <p:cSld>
+    <p:spTree>
+      <p:nvGrpSpPr>
+        <p:cNvPr id="1" name=""/>
+        <p:cNvGrpSpPr/>
+        <p:nvPr/>
+      </p:nvGrpSpPr>
+      <p:grpSpPr>
+        <a:xfrm>
+          <a:off x="0" y="0"/>
+          <a:ext cx="0" cy="0"/>
+          <a:chOff x="0" y="0"/>
+          <a:chExt cx="0" cy="0"/>
+        </a:xfrm>
+      </p:grpSpPr>
+      <p:sp>
+        <p:nvSpPr>
+          <p:cNvPr id="2" name="Slide Image Placeholder 1"/>
+          <p:cNvSpPr>
+            <a:spLocks noGrp="1" noRot="1" noChangeAspect="1"/>
+          </p:cNvSpPr>
+          <p:nvPr>
+            <p:ph type="sldImg"/>
+          </p:nvPr>
+        </p:nvSpPr>
+        <p:spPr/>
+      </p:sp>
+      <p:sp>
+        <p:nvSpPr>
+          <p:cNvPr id="3" name="Notes Placeholder 2"/>
+          <p:cNvSpPr>
+            <a:spLocks noGrp="1"/>
+          </p:cNvSpPr>
+          <p:nvPr>
+            <p:ph type="body" idx="1"/>
+          </p:nvPr>
+        </p:nvSpPr>
+        <p:spPr/>
+        <p:txBody>
+          <a:bodyPr/>
+          <a:lstStyle/>
+          <a:p>
+            <a:pPr marL="0" marR="0">
+              <a:lnSpc>
+                <a:spcPct val="150000"/>
+              </a:lnSpc>
+              <a:spcBef>
+                <a:spcPts val="0"/>
+              </a:spcBef>
+              <a:spcAft>
+                <a:spcPts val="800"/>
+              </a:spcAft>
+            </a:pPr>
+            <a:r>
+              <a:rPr lang="en-US" sz="1800" kern="100" dirty="0">
+                <a:effectLst/>
+                <a:latin typeface="Calibri" panose="020F0502020204030204" pitchFamily="34" charset="0"/>
+                <a:ea typeface="Calibri" panose="020F0502020204030204" pitchFamily="34" charset="0"/>
+                <a:cs typeface="Times New Roman" panose="02020603050405020304" pitchFamily="18" charset="0"/>
+              </a:rPr>
+              <a:t>Here are examples of each format </a:t>
+            </a:r>
+          </a:p>
+          <a:p>
+            <a:pPr marL="0" marR="0">
+              <a:lnSpc>
+                <a:spcPct val="150000"/>
+              </a:lnSpc>
+              <a:spcBef>
+                <a:spcPts val="0"/>
+              </a:spcBef>
+              <a:spcAft>
+                <a:spcPts val="800"/>
+              </a:spcAft>
+            </a:pPr>
+            <a:r>
+              <a:rPr lang="en-US" sz="1800" kern="100" dirty="0">
+                <a:effectLst/>
+                <a:latin typeface="Calibri" panose="020F0502020204030204" pitchFamily="34" charset="0"/>
+                <a:ea typeface="Calibri" panose="020F0502020204030204" pitchFamily="34" charset="0"/>
+                <a:cs typeface="Times New Roman" panose="02020603050405020304" pitchFamily="18" charset="0"/>
+              </a:rPr>
+              <a:t>JSON looks like its an array format and XML format, very similar to HTML but is not in HTML sections</a:t>
+            </a:r>
+          </a:p>
+          <a:p>
+            <a:endParaRPr lang="en-US" dirty="0"/>
+          </a:p>
+        </p:txBody>
+      </p:sp>
+      <p:sp>
+        <p:nvSpPr>
+          <p:cNvPr id="4" name="Slide Number Placeholder 3"/>
+          <p:cNvSpPr>
+            <a:spLocks noGrp="1"/>
+          </p:cNvSpPr>
+          <p:nvPr>
+            <p:ph type="sldNum" sz="quarter" idx="5"/>
+          </p:nvPr>
+        </p:nvSpPr>
+        <p:spPr/>
+        <p:txBody>
+          <a:bodyPr/>
+          <a:lstStyle/>
+          <a:p>
+            <a:fld id="{9DCE2504-C28B-4080-B704-27D98903179C}" type="slidenum">
+              <a:rPr lang="en-US" smtClean="0"/>
+              <a:t>4</a:t>
+            </a:fld>
+            <a:endParaRPr lang="en-US"/>
+          </a:p>
+        </p:txBody>
+      </p:sp>
+    </p:spTree>
+    <p:extLst>
+      <p:ext uri="{BB962C8B-B14F-4D97-AF65-F5344CB8AC3E}">
+        <p14:creationId xmlns:p14="http://schemas.microsoft.com/office/powerpoint/2010/main" val="2921376829"/>
+      </p:ext>
+    </p:extLst>
+  </p:cSld>
+  <p:clrMapOvr>
+    <a:masterClrMapping/>
+  </p:clrMapOvr>
+</p:notes>
+</file>
+
+<file path=ppt/notesSlides/notesSlide4.xml><?xml version="1.0" encoding="utf-8"?>
+<p:notes xmlns:a="http://schemas.openxmlformats.org/drawingml/2006/main" xmlns:r="http://schemas.openxmlformats.org/officeDocument/2006/relationships" xmlns:p="http://schemas.openxmlformats.org/presentationml/2006/main">
+  <p:cSld>
+    <p:spTree>
+      <p:nvGrpSpPr>
+        <p:cNvPr id="1" name=""/>
+        <p:cNvGrpSpPr/>
+        <p:nvPr/>
+      </p:nvGrpSpPr>
+      <p:grpSpPr>
+        <a:xfrm>
+          <a:off x="0" y="0"/>
+          <a:ext cx="0" cy="0"/>
+          <a:chOff x="0" y="0"/>
+          <a:chExt cx="0" cy="0"/>
+        </a:xfrm>
+      </p:grpSpPr>
+      <p:sp>
+        <p:nvSpPr>
+          <p:cNvPr id="2" name="Slide Image Placeholder 1"/>
+          <p:cNvSpPr>
+            <a:spLocks noGrp="1" noRot="1" noChangeAspect="1"/>
+          </p:cNvSpPr>
+          <p:nvPr>
+            <p:ph type="sldImg"/>
+          </p:nvPr>
+        </p:nvSpPr>
+        <p:spPr/>
+      </p:sp>
+      <p:sp>
+        <p:nvSpPr>
+          <p:cNvPr id="3" name="Notes Placeholder 2"/>
+          <p:cNvSpPr>
+            <a:spLocks noGrp="1"/>
+          </p:cNvSpPr>
+          <p:nvPr>
+            <p:ph type="body" idx="1"/>
+          </p:nvPr>
+        </p:nvSpPr>
+        <p:spPr/>
+        <p:txBody>
+          <a:bodyPr/>
+          <a:lstStyle/>
+          <a:p>
+            <a:pPr marL="0" marR="0" lvl="0" indent="0" algn="l" defTabSz="914400" rtl="0" eaLnBrk="1" fontAlgn="auto" latinLnBrk="0" hangingPunct="1">
+              <a:lnSpc>
+                <a:spcPct val="100000"/>
+              </a:lnSpc>
+              <a:spcBef>
+                <a:spcPts val="0"/>
+              </a:spcBef>
+              <a:spcAft>
+                <a:spcPts val="0"/>
+              </a:spcAft>
+              <a:buClrTx/>
+              <a:buSzTx/>
+              <a:buFontTx/>
+              <a:buNone/>
+              <a:tabLst/>
+              <a:defRPr/>
+            </a:pPr>
+            <a:r>
+              <a:rPr lang="en-US" sz="1800" kern="100" dirty="0">
+                <a:effectLst/>
+                <a:latin typeface="Calibri" panose="020F0502020204030204" pitchFamily="34" charset="0"/>
+                <a:ea typeface="Calibri" panose="020F0502020204030204" pitchFamily="34" charset="0"/>
+                <a:cs typeface="Times New Roman" panose="02020603050405020304" pitchFamily="18" charset="0"/>
+              </a:rPr>
+              <a:t>HTML creates an HTML viewable  page out of the data while YAML is used mainly for human display and readability.</a:t>
+            </a:r>
+          </a:p>
+          <a:p>
+            <a:endParaRPr lang="en-US" dirty="0"/>
+          </a:p>
+        </p:txBody>
+      </p:sp>
+      <p:sp>
+        <p:nvSpPr>
+          <p:cNvPr id="4" name="Slide Number Placeholder 3"/>
+          <p:cNvSpPr>
+            <a:spLocks noGrp="1"/>
+          </p:cNvSpPr>
+          <p:nvPr>
+            <p:ph type="sldNum" sz="quarter" idx="5"/>
+          </p:nvPr>
+        </p:nvSpPr>
+        <p:spPr/>
+        <p:txBody>
+          <a:bodyPr/>
+          <a:lstStyle/>
+          <a:p>
+            <a:fld id="{9DCE2504-C28B-4080-B704-27D98903179C}" type="slidenum">
+              <a:rPr lang="en-US" smtClean="0"/>
+              <a:t>5</a:t>
+            </a:fld>
+            <a:endParaRPr lang="en-US"/>
+          </a:p>
+        </p:txBody>
+      </p:sp>
+    </p:spTree>
+    <p:extLst>
+      <p:ext uri="{BB962C8B-B14F-4D97-AF65-F5344CB8AC3E}">
+        <p14:creationId xmlns:p14="http://schemas.microsoft.com/office/powerpoint/2010/main" val="1083627343"/>
+      </p:ext>
+    </p:extLst>
+  </p:cSld>
+  <p:clrMapOvr>
+    <a:masterClrMapping/>
+  </p:clrMapOvr>
+</p:notes>
+</file>
+
+<file path=ppt/notesSlides/notesSlide5.xml><?xml version="1.0" encoding="utf-8"?>
+<p:notes xmlns:a="http://schemas.openxmlformats.org/drawingml/2006/main" xmlns:r="http://schemas.openxmlformats.org/officeDocument/2006/relationships" xmlns:p="http://schemas.openxmlformats.org/presentationml/2006/main">
+  <p:cSld>
+    <p:spTree>
+      <p:nvGrpSpPr>
+        <p:cNvPr id="1" name=""/>
+        <p:cNvGrpSpPr/>
+        <p:nvPr/>
+      </p:nvGrpSpPr>
+      <p:grpSpPr>
+        <a:xfrm>
+          <a:off x="0" y="0"/>
+          <a:ext cx="0" cy="0"/>
+          <a:chOff x="0" y="0"/>
+          <a:chExt cx="0" cy="0"/>
+        </a:xfrm>
+      </p:grpSpPr>
+      <p:sp>
+        <p:nvSpPr>
+          <p:cNvPr id="2" name="Slide Image Placeholder 1"/>
+          <p:cNvSpPr>
+            <a:spLocks noGrp="1" noRot="1" noChangeAspect="1"/>
+          </p:cNvSpPr>
+          <p:nvPr>
+            <p:ph type="sldImg"/>
+          </p:nvPr>
+        </p:nvSpPr>
+        <p:spPr/>
+      </p:sp>
+      <p:sp>
+        <p:nvSpPr>
+          <p:cNvPr id="3" name="Notes Placeholder 2"/>
+          <p:cNvSpPr>
+            <a:spLocks noGrp="1"/>
+          </p:cNvSpPr>
+          <p:nvPr>
+            <p:ph type="body" idx="1"/>
+          </p:nvPr>
+        </p:nvSpPr>
+        <p:spPr/>
+        <p:txBody>
+          <a:bodyPr/>
+          <a:lstStyle/>
+          <a:p>
+            <a:pPr marL="0" marR="0">
+              <a:lnSpc>
+                <a:spcPct val="150000"/>
+              </a:lnSpc>
+              <a:spcBef>
+                <a:spcPts val="0"/>
+              </a:spcBef>
+              <a:spcAft>
+                <a:spcPts val="800"/>
+              </a:spcAft>
+            </a:pPr>
+            <a:r>
+              <a:rPr lang="en-US" sz="1800" kern="100" dirty="0">
+                <a:effectLst/>
+                <a:latin typeface="Calibri" panose="020F0502020204030204" pitchFamily="34" charset="0"/>
+                <a:ea typeface="Calibri" panose="020F0502020204030204" pitchFamily="34" charset="0"/>
+                <a:cs typeface="Times New Roman" panose="02020603050405020304" pitchFamily="18" charset="0"/>
+              </a:rPr>
+              <a:t>API Key: A simple alphanumeric string that the client should send to authenticate the request.</a:t>
+            </a:r>
+          </a:p>
+          <a:p>
+            <a:pPr marL="0" marR="0">
+              <a:lnSpc>
+                <a:spcPct val="150000"/>
+              </a:lnSpc>
+              <a:spcBef>
+                <a:spcPts val="0"/>
+              </a:spcBef>
+              <a:spcAft>
+                <a:spcPts val="800"/>
+              </a:spcAft>
+            </a:pPr>
+            <a:r>
+              <a:rPr lang="en-US" sz="1800" kern="100" dirty="0">
+                <a:effectLst/>
+                <a:latin typeface="Calibri" panose="020F0502020204030204" pitchFamily="34" charset="0"/>
+                <a:ea typeface="Calibri" panose="020F0502020204030204" pitchFamily="34" charset="0"/>
+                <a:cs typeface="Times New Roman" panose="02020603050405020304" pitchFamily="18" charset="0"/>
+              </a:rPr>
+              <a:t>Basic Auth: Uses a username and password combination to authenticate.</a:t>
+            </a:r>
+          </a:p>
+          <a:p>
+            <a:pPr marL="0" marR="0">
+              <a:lnSpc>
+                <a:spcPct val="150000"/>
+              </a:lnSpc>
+              <a:spcBef>
+                <a:spcPts val="0"/>
+              </a:spcBef>
+              <a:spcAft>
+                <a:spcPts val="800"/>
+              </a:spcAft>
+            </a:pPr>
+            <a:r>
+              <a:rPr lang="en-US" sz="1800" kern="100" dirty="0">
+                <a:effectLst/>
+                <a:latin typeface="Calibri" panose="020F0502020204030204" pitchFamily="34" charset="0"/>
+                <a:ea typeface="Calibri" panose="020F0502020204030204" pitchFamily="34" charset="0"/>
+                <a:cs typeface="Times New Roman" panose="02020603050405020304" pitchFamily="18" charset="0"/>
+              </a:rPr>
+              <a:t>OAuth: A common authorization protocol. There are two versions: OAuth 1.0a and OAuth 2.0, with OAuth 2.0 being more common. It allows third-party services to exchange user's access credentials for an access token.</a:t>
+            </a:r>
+          </a:p>
+          <a:p>
+            <a:pPr marL="0" marR="0">
+              <a:lnSpc>
+                <a:spcPct val="150000"/>
+              </a:lnSpc>
+              <a:spcBef>
+                <a:spcPts val="0"/>
+              </a:spcBef>
+              <a:spcAft>
+                <a:spcPts val="800"/>
+              </a:spcAft>
+            </a:pPr>
+            <a:r>
+              <a:rPr lang="en-US" sz="1800" kern="100" dirty="0">
+                <a:effectLst/>
+                <a:latin typeface="Calibri" panose="020F0502020204030204" pitchFamily="34" charset="0"/>
+                <a:ea typeface="Calibri" panose="020F0502020204030204" pitchFamily="34" charset="0"/>
+                <a:cs typeface="Times New Roman" panose="02020603050405020304" pitchFamily="18" charset="0"/>
+              </a:rPr>
+              <a:t>Bearer Token: A type of token authentication where the client sends a token with every request to authenticate.</a:t>
+            </a:r>
+          </a:p>
+          <a:p>
+            <a:pPr marL="0" marR="0">
+              <a:lnSpc>
+                <a:spcPct val="150000"/>
+              </a:lnSpc>
+              <a:spcBef>
+                <a:spcPts val="0"/>
+              </a:spcBef>
+              <a:spcAft>
+                <a:spcPts val="800"/>
+              </a:spcAft>
+            </a:pPr>
+            <a:r>
+              <a:rPr lang="en-US" sz="1800" kern="100" dirty="0">
+                <a:effectLst/>
+                <a:latin typeface="Calibri" panose="020F0502020204030204" pitchFamily="34" charset="0"/>
+                <a:ea typeface="Calibri" panose="020F0502020204030204" pitchFamily="34" charset="0"/>
+                <a:cs typeface="Times New Roman" panose="02020603050405020304" pitchFamily="18" charset="0"/>
+              </a:rPr>
+              <a:t> </a:t>
+            </a:r>
+          </a:p>
+          <a:p>
+            <a:pPr marL="0" marR="0">
+              <a:lnSpc>
+                <a:spcPct val="150000"/>
+              </a:lnSpc>
+              <a:spcBef>
+                <a:spcPts val="0"/>
+              </a:spcBef>
+              <a:spcAft>
+                <a:spcPts val="800"/>
+              </a:spcAft>
+            </a:pPr>
+            <a:r>
+              <a:rPr lang="en-US" sz="1800" kern="100" dirty="0">
+                <a:effectLst/>
+                <a:latin typeface="Calibri" panose="020F0502020204030204" pitchFamily="34" charset="0"/>
+                <a:ea typeface="Calibri" panose="020F0502020204030204" pitchFamily="34" charset="0"/>
+                <a:cs typeface="Times New Roman" panose="02020603050405020304" pitchFamily="18" charset="0"/>
+              </a:rPr>
+              <a:t>Different API’s have different usage capabilities and restrictions</a:t>
+            </a:r>
+          </a:p>
+          <a:p>
+            <a:pPr marL="0" marR="0">
+              <a:lnSpc>
+                <a:spcPct val="150000"/>
+              </a:lnSpc>
+              <a:spcBef>
+                <a:spcPts val="0"/>
+              </a:spcBef>
+              <a:spcAft>
+                <a:spcPts val="800"/>
+              </a:spcAft>
+            </a:pPr>
+            <a:r>
+              <a:rPr lang="en-US" sz="1800" kern="100" dirty="0">
+                <a:effectLst/>
+                <a:latin typeface="Calibri" panose="020F0502020204030204" pitchFamily="34" charset="0"/>
+                <a:ea typeface="Calibri" panose="020F0502020204030204" pitchFamily="34" charset="0"/>
+                <a:cs typeface="Times New Roman" panose="02020603050405020304" pitchFamily="18" charset="0"/>
+              </a:rPr>
+              <a:t>Some are free, many are not. </a:t>
+            </a:r>
+          </a:p>
+          <a:p>
+            <a:pPr marL="0" marR="0">
+              <a:lnSpc>
+                <a:spcPct val="150000"/>
+              </a:lnSpc>
+              <a:spcBef>
+                <a:spcPts val="0"/>
+              </a:spcBef>
+              <a:spcAft>
+                <a:spcPts val="800"/>
+              </a:spcAft>
+            </a:pPr>
+            <a:r>
+              <a:rPr lang="en-US" sz="1800" kern="100" dirty="0">
+                <a:effectLst/>
+                <a:latin typeface="Calibri" panose="020F0502020204030204" pitchFamily="34" charset="0"/>
+                <a:ea typeface="Calibri" panose="020F0502020204030204" pitchFamily="34" charset="0"/>
+                <a:cs typeface="Times New Roman" panose="02020603050405020304" pitchFamily="18" charset="0"/>
+              </a:rPr>
+              <a:t>Almost all have a limited number of allowed calls or transactions within a set timeframe.</a:t>
+            </a:r>
+          </a:p>
+          <a:p>
+            <a:pPr marL="0" marR="0">
+              <a:lnSpc>
+                <a:spcPct val="150000"/>
+              </a:lnSpc>
+              <a:spcBef>
+                <a:spcPts val="0"/>
+              </a:spcBef>
+              <a:spcAft>
+                <a:spcPts val="800"/>
+              </a:spcAft>
+            </a:pPr>
+            <a:r>
+              <a:rPr lang="en-US" sz="1800" kern="100" dirty="0">
+                <a:effectLst/>
+                <a:latin typeface="Calibri" panose="020F0502020204030204" pitchFamily="34" charset="0"/>
+                <a:ea typeface="Calibri" panose="020F0502020204030204" pitchFamily="34" charset="0"/>
+                <a:cs typeface="Times New Roman" panose="02020603050405020304" pitchFamily="18" charset="0"/>
+              </a:rPr>
+              <a:t>Where are </a:t>
+            </a:r>
+            <a:r>
+              <a:rPr lang="en-US" sz="1800" kern="100" dirty="0" err="1">
+                <a:effectLst/>
+                <a:latin typeface="Calibri" panose="020F0502020204030204" pitchFamily="34" charset="0"/>
+                <a:ea typeface="Calibri" panose="020F0502020204030204" pitchFamily="34" charset="0"/>
+                <a:cs typeface="Times New Roman" panose="02020603050405020304" pitchFamily="18" charset="0"/>
+              </a:rPr>
+              <a:t>Restfull</a:t>
+            </a:r>
+            <a:r>
+              <a:rPr lang="en-US" sz="1800" kern="100" dirty="0">
+                <a:effectLst/>
+                <a:latin typeface="Calibri" panose="020F0502020204030204" pitchFamily="34" charset="0"/>
+                <a:ea typeface="Calibri" panose="020F0502020204030204" pitchFamily="34" charset="0"/>
+                <a:cs typeface="Times New Roman" panose="02020603050405020304" pitchFamily="18" charset="0"/>
+              </a:rPr>
+              <a:t> API’s used?</a:t>
+            </a:r>
+          </a:p>
+          <a:p>
+            <a:endParaRPr lang="en-US" dirty="0"/>
+          </a:p>
+        </p:txBody>
+      </p:sp>
+      <p:sp>
+        <p:nvSpPr>
+          <p:cNvPr id="4" name="Slide Number Placeholder 3"/>
+          <p:cNvSpPr>
+            <a:spLocks noGrp="1"/>
+          </p:cNvSpPr>
+          <p:nvPr>
+            <p:ph type="sldNum" sz="quarter" idx="5"/>
+          </p:nvPr>
+        </p:nvSpPr>
+        <p:spPr/>
+        <p:txBody>
+          <a:bodyPr/>
+          <a:lstStyle/>
+          <a:p>
+            <a:fld id="{9DCE2504-C28B-4080-B704-27D98903179C}" type="slidenum">
+              <a:rPr lang="en-US" smtClean="0"/>
+              <a:t>6</a:t>
+            </a:fld>
+            <a:endParaRPr lang="en-US"/>
+          </a:p>
+        </p:txBody>
+      </p:sp>
+    </p:spTree>
+    <p:extLst>
+      <p:ext uri="{BB962C8B-B14F-4D97-AF65-F5344CB8AC3E}">
+        <p14:creationId xmlns:p14="http://schemas.microsoft.com/office/powerpoint/2010/main" val="343002891"/>
+      </p:ext>
+    </p:extLst>
+  </p:cSld>
+  <p:clrMapOvr>
+    <a:masterClrMapping/>
+  </p:clrMapOvr>
+</p:notes>
+</file>
+
+<file path=ppt/notesSlides/notesSlide6.xml><?xml version="1.0" encoding="utf-8"?>
+<p:notes xmlns:a="http://schemas.openxmlformats.org/drawingml/2006/main" xmlns:r="http://schemas.openxmlformats.org/officeDocument/2006/relationships" xmlns:p="http://schemas.openxmlformats.org/presentationml/2006/main">
+  <p:cSld>
+    <p:spTree>
+      <p:nvGrpSpPr>
+        <p:cNvPr id="1" name=""/>
+        <p:cNvGrpSpPr/>
+        <p:nvPr/>
+      </p:nvGrpSpPr>
+      <p:grpSpPr>
+        <a:xfrm>
+          <a:off x="0" y="0"/>
+          <a:ext cx="0" cy="0"/>
+          <a:chOff x="0" y="0"/>
+          <a:chExt cx="0" cy="0"/>
+        </a:xfrm>
+      </p:grpSpPr>
+      <p:sp>
+        <p:nvSpPr>
+          <p:cNvPr id="2" name="Slide Image Placeholder 1"/>
+          <p:cNvSpPr>
+            <a:spLocks noGrp="1" noRot="1" noChangeAspect="1"/>
+          </p:cNvSpPr>
+          <p:nvPr>
+            <p:ph type="sldImg"/>
+          </p:nvPr>
+        </p:nvSpPr>
+        <p:spPr/>
+      </p:sp>
+      <p:sp>
+        <p:nvSpPr>
+          <p:cNvPr id="3" name="Notes Placeholder 2"/>
+          <p:cNvSpPr>
+            <a:spLocks noGrp="1"/>
+          </p:cNvSpPr>
+          <p:nvPr>
+            <p:ph type="body" idx="1"/>
+          </p:nvPr>
+        </p:nvSpPr>
+        <p:spPr/>
+        <p:txBody>
+          <a:bodyPr/>
+          <a:lstStyle/>
+          <a:p>
+            <a:pPr marL="0" marR="0" lvl="0" indent="0" algn="l" defTabSz="914400" rtl="0" eaLnBrk="1" fontAlgn="auto" latinLnBrk="0" hangingPunct="1">
+              <a:lnSpc>
+                <a:spcPct val="100000"/>
+              </a:lnSpc>
+              <a:spcBef>
+                <a:spcPts val="0"/>
+              </a:spcBef>
+              <a:spcAft>
+                <a:spcPts val="0"/>
+              </a:spcAft>
+              <a:buClrTx/>
+              <a:buSzTx/>
+              <a:buFontTx/>
+              <a:buNone/>
+              <a:tabLst/>
+              <a:defRPr/>
+            </a:pPr>
+            <a:r>
+              <a:rPr lang="en-US" sz="1800" kern="100" dirty="0">
+                <a:effectLst/>
+                <a:latin typeface="Calibri" panose="020F0502020204030204" pitchFamily="34" charset="0"/>
+                <a:ea typeface="Calibri" panose="020F0502020204030204" pitchFamily="34" charset="0"/>
+                <a:cs typeface="Times New Roman" panose="02020603050405020304" pitchFamily="18" charset="0"/>
+              </a:rPr>
+              <a:t>At the plant I use to work at we used this to update plant status to a display.</a:t>
+            </a:r>
+            <a:endParaRPr lang="en-US" dirty="0"/>
+          </a:p>
+        </p:txBody>
+      </p:sp>
+      <p:sp>
+        <p:nvSpPr>
+          <p:cNvPr id="4" name="Slide Number Placeholder 3"/>
+          <p:cNvSpPr>
+            <a:spLocks noGrp="1"/>
+          </p:cNvSpPr>
+          <p:nvPr>
+            <p:ph type="sldNum" sz="quarter" idx="5"/>
+          </p:nvPr>
+        </p:nvSpPr>
+        <p:spPr/>
+        <p:txBody>
+          <a:bodyPr/>
+          <a:lstStyle/>
+          <a:p>
+            <a:fld id="{9DCE2504-C28B-4080-B704-27D98903179C}" type="slidenum">
+              <a:rPr lang="en-US" smtClean="0"/>
+              <a:t>7</a:t>
+            </a:fld>
+            <a:endParaRPr lang="en-US"/>
+          </a:p>
+        </p:txBody>
+      </p:sp>
+    </p:spTree>
+    <p:extLst>
+      <p:ext uri="{BB962C8B-B14F-4D97-AF65-F5344CB8AC3E}">
+        <p14:creationId xmlns:p14="http://schemas.microsoft.com/office/powerpoint/2010/main" val="3327202722"/>
+      </p:ext>
+    </p:extLst>
+  </p:cSld>
+  <p:clrMapOvr>
+    <a:masterClrMapping/>
+  </p:clrMapOvr>
+</p:notes>
+</file>
+
+<file path=ppt/notesSlides/notesSlide7.xml><?xml version="1.0" encoding="utf-8"?>
+<p:notes xmlns:a="http://schemas.openxmlformats.org/drawingml/2006/main" xmlns:r="http://schemas.openxmlformats.org/officeDocument/2006/relationships" xmlns:p="http://schemas.openxmlformats.org/presentationml/2006/main">
+  <p:cSld>
+    <p:spTree>
+      <p:nvGrpSpPr>
+        <p:cNvPr id="1" name=""/>
+        <p:cNvGrpSpPr/>
+        <p:nvPr/>
+      </p:nvGrpSpPr>
+      <p:grpSpPr>
+        <a:xfrm>
+          <a:off x="0" y="0"/>
+          <a:ext cx="0" cy="0"/>
+          <a:chOff x="0" y="0"/>
+          <a:chExt cx="0" cy="0"/>
+        </a:xfrm>
+      </p:grpSpPr>
+      <p:sp>
+        <p:nvSpPr>
+          <p:cNvPr id="2" name="Slide Image Placeholder 1"/>
+          <p:cNvSpPr>
+            <a:spLocks noGrp="1" noRot="1" noChangeAspect="1"/>
+          </p:cNvSpPr>
+          <p:nvPr>
+            <p:ph type="sldImg"/>
+          </p:nvPr>
+        </p:nvSpPr>
+        <p:spPr/>
+      </p:sp>
+      <p:sp>
+        <p:nvSpPr>
+          <p:cNvPr id="3" name="Notes Placeholder 2"/>
+          <p:cNvSpPr>
+            <a:spLocks noGrp="1"/>
+          </p:cNvSpPr>
+          <p:nvPr>
+            <p:ph type="body" idx="1"/>
+          </p:nvPr>
+        </p:nvSpPr>
+        <p:spPr/>
+        <p:txBody>
+          <a:bodyPr/>
+          <a:lstStyle/>
+          <a:p>
+            <a:pPr marL="0" marR="0" lvl="0" indent="0" algn="l" defTabSz="914400" rtl="0" eaLnBrk="1" fontAlgn="auto" latinLnBrk="0" hangingPunct="1">
+              <a:lnSpc>
+                <a:spcPct val="100000"/>
+              </a:lnSpc>
+              <a:spcBef>
+                <a:spcPts val="0"/>
+              </a:spcBef>
+              <a:spcAft>
+                <a:spcPts val="0"/>
+              </a:spcAft>
+              <a:buClrTx/>
+              <a:buSzTx/>
+              <a:buFontTx/>
+              <a:buNone/>
+              <a:tabLst/>
+              <a:defRPr/>
+            </a:pPr>
+            <a:r>
+              <a:rPr lang="en-US" sz="1200" kern="100" dirty="0">
+                <a:effectLst/>
+                <a:latin typeface="Calibri" panose="020F0502020204030204" pitchFamily="34" charset="0"/>
+                <a:ea typeface="Calibri" panose="020F0502020204030204" pitchFamily="34" charset="0"/>
+                <a:cs typeface="Times New Roman" panose="02020603050405020304" pitchFamily="18" charset="0"/>
+              </a:rPr>
+              <a:t> we also use this on a schedule to update our accounting system based on consumption and creation information. </a:t>
+            </a:r>
+          </a:p>
+          <a:p>
+            <a:endParaRPr lang="en-US" dirty="0"/>
+          </a:p>
+        </p:txBody>
+      </p:sp>
+      <p:sp>
+        <p:nvSpPr>
+          <p:cNvPr id="4" name="Slide Number Placeholder 3"/>
+          <p:cNvSpPr>
+            <a:spLocks noGrp="1"/>
+          </p:cNvSpPr>
+          <p:nvPr>
+            <p:ph type="sldNum" sz="quarter" idx="5"/>
+          </p:nvPr>
+        </p:nvSpPr>
+        <p:spPr/>
+        <p:txBody>
+          <a:bodyPr/>
+          <a:lstStyle/>
+          <a:p>
+            <a:fld id="{9DCE2504-C28B-4080-B704-27D98903179C}" type="slidenum">
+              <a:rPr lang="en-US" smtClean="0"/>
+              <a:t>8</a:t>
+            </a:fld>
+            <a:endParaRPr lang="en-US"/>
+          </a:p>
+        </p:txBody>
+      </p:sp>
+    </p:spTree>
+    <p:extLst>
+      <p:ext uri="{BB962C8B-B14F-4D97-AF65-F5344CB8AC3E}">
+        <p14:creationId xmlns:p14="http://schemas.microsoft.com/office/powerpoint/2010/main" val="324564780"/>
+      </p:ext>
+    </p:extLst>
+  </p:cSld>
+  <p:clrMapOvr>
+    <a:masterClrMapping/>
+  </p:clrMapOvr>
+</p:notes>
+</file>
+
+<file path=ppt/notesSlides/notesSlide8.xml><?xml version="1.0" encoding="utf-8"?>
+<p:notes xmlns:a="http://schemas.openxmlformats.org/drawingml/2006/main" xmlns:r="http://schemas.openxmlformats.org/officeDocument/2006/relationships" xmlns:p="http://schemas.openxmlformats.org/presentationml/2006/main">
+  <p:cSld>
+    <p:spTree>
+      <p:nvGrpSpPr>
+        <p:cNvPr id="1" name=""/>
+        <p:cNvGrpSpPr/>
+        <p:nvPr/>
+      </p:nvGrpSpPr>
+      <p:grpSpPr>
+        <a:xfrm>
+          <a:off x="0" y="0"/>
+          <a:ext cx="0" cy="0"/>
+          <a:chOff x="0" y="0"/>
+          <a:chExt cx="0" cy="0"/>
+        </a:xfrm>
+      </p:grpSpPr>
+      <p:sp>
+        <p:nvSpPr>
+          <p:cNvPr id="2" name="Slide Image Placeholder 1"/>
+          <p:cNvSpPr>
+            <a:spLocks noGrp="1" noRot="1" noChangeAspect="1"/>
+          </p:cNvSpPr>
+          <p:nvPr>
+            <p:ph type="sldImg"/>
+          </p:nvPr>
+        </p:nvSpPr>
+        <p:spPr/>
+      </p:sp>
+      <p:sp>
+        <p:nvSpPr>
+          <p:cNvPr id="3" name="Notes Placeholder 2"/>
+          <p:cNvSpPr>
+            <a:spLocks noGrp="1"/>
+          </p:cNvSpPr>
+          <p:nvPr>
+            <p:ph type="body" idx="1"/>
+          </p:nvPr>
+        </p:nvSpPr>
+        <p:spPr/>
+        <p:txBody>
+          <a:bodyPr/>
+          <a:lstStyle/>
+          <a:p>
+            <a:r>
+              <a:rPr lang="en-US" dirty="0"/>
+              <a:t>I have used a couple of API in my personal coding one is the </a:t>
+            </a:r>
+            <a:r>
+              <a:rPr lang="en-US" dirty="0" err="1"/>
+              <a:t>PokeAPI</a:t>
+            </a:r>
+            <a:r>
+              <a:rPr lang="en-US" dirty="0"/>
+              <a:t>  I built a game using the images from the site loading them into an array so that I would only have to make a single call for each of the sub entity Pokémon.  You can see in the array that there are multiple different queries,</a:t>
+            </a:r>
+          </a:p>
+        </p:txBody>
+      </p:sp>
+      <p:sp>
+        <p:nvSpPr>
+          <p:cNvPr id="4" name="Slide Number Placeholder 3"/>
+          <p:cNvSpPr>
+            <a:spLocks noGrp="1"/>
+          </p:cNvSpPr>
+          <p:nvPr>
+            <p:ph type="sldNum" sz="quarter" idx="5"/>
+          </p:nvPr>
+        </p:nvSpPr>
+        <p:spPr/>
+        <p:txBody>
+          <a:bodyPr/>
+          <a:lstStyle/>
+          <a:p>
+            <a:fld id="{9DCE2504-C28B-4080-B704-27D98903179C}" type="slidenum">
+              <a:rPr lang="en-US" smtClean="0"/>
+              <a:t>9</a:t>
+            </a:fld>
+            <a:endParaRPr lang="en-US"/>
+          </a:p>
+        </p:txBody>
+      </p:sp>
+    </p:spTree>
+    <p:extLst>
+      <p:ext uri="{BB962C8B-B14F-4D97-AF65-F5344CB8AC3E}">
+        <p14:creationId xmlns:p14="http://schemas.microsoft.com/office/powerpoint/2010/main" val="462373757"/>
+      </p:ext>
+    </p:extLst>
+  </p:cSld>
+  <p:clrMapOvr>
+    <a:masterClrMapping/>
+  </p:clrMapOvr>
+</p:notes>
+</file>
+
+<file path=ppt/notesSlides/notesSlide9.xml><?xml version="1.0" encoding="utf-8"?>
+<p:notes xmlns:a="http://schemas.openxmlformats.org/drawingml/2006/main" xmlns:r="http://schemas.openxmlformats.org/officeDocument/2006/relationships" xmlns:p="http://schemas.openxmlformats.org/presentationml/2006/main">
+  <p:cSld>
+    <p:spTree>
+      <p:nvGrpSpPr>
+        <p:cNvPr id="1" name=""/>
+        <p:cNvGrpSpPr/>
+        <p:nvPr/>
+      </p:nvGrpSpPr>
+      <p:grpSpPr>
+        <a:xfrm>
+          <a:off x="0" y="0"/>
+          <a:ext cx="0" cy="0"/>
+          <a:chOff x="0" y="0"/>
+          <a:chExt cx="0" cy="0"/>
+        </a:xfrm>
+      </p:grpSpPr>
+      <p:sp>
+        <p:nvSpPr>
+          <p:cNvPr id="2" name="Slide Image Placeholder 1"/>
+          <p:cNvSpPr>
+            <a:spLocks noGrp="1" noRot="1" noChangeAspect="1"/>
+          </p:cNvSpPr>
+          <p:nvPr>
+            <p:ph type="sldImg"/>
+          </p:nvPr>
+        </p:nvSpPr>
+        <p:spPr/>
+      </p:sp>
+      <p:sp>
+        <p:nvSpPr>
+          <p:cNvPr id="3" name="Notes Placeholder 2"/>
+          <p:cNvSpPr>
+            <a:spLocks noGrp="1"/>
+          </p:cNvSpPr>
+          <p:nvPr>
+            <p:ph type="body" idx="1"/>
+          </p:nvPr>
+        </p:nvSpPr>
+        <p:spPr/>
+        <p:txBody>
+          <a:bodyPr/>
+          <a:lstStyle/>
+          <a:p>
+            <a:pPr marL="0" marR="0" lvl="0" indent="0" algn="l" defTabSz="914400" rtl="0" eaLnBrk="1" fontAlgn="auto" latinLnBrk="0" hangingPunct="1">
+              <a:lnSpc>
+                <a:spcPct val="100000"/>
+              </a:lnSpc>
+              <a:spcBef>
+                <a:spcPts val="0"/>
+              </a:spcBef>
+              <a:spcAft>
+                <a:spcPts val="0"/>
+              </a:spcAft>
+              <a:buClrTx/>
+              <a:buSzTx/>
+              <a:buFontTx/>
+              <a:buNone/>
+              <a:tabLst/>
+              <a:defRPr/>
+            </a:pPr>
+            <a:r>
+              <a:rPr lang="en-US" dirty="0"/>
+              <a:t> and here is a </a:t>
+            </a:r>
+            <a:r>
+              <a:rPr lang="en-US" dirty="0" err="1"/>
+              <a:t>snippit</a:t>
+            </a:r>
+            <a:r>
+              <a:rPr lang="en-US" dirty="0"/>
+              <a:t> of code I used for the calls. &lt;&lt;CHANGE TO GAME&gt;&gt;</a:t>
+            </a:r>
+          </a:p>
+          <a:p>
+            <a:endParaRPr lang="en-US" dirty="0"/>
+          </a:p>
+        </p:txBody>
+      </p:sp>
+      <p:sp>
+        <p:nvSpPr>
+          <p:cNvPr id="4" name="Slide Number Placeholder 3"/>
+          <p:cNvSpPr>
+            <a:spLocks noGrp="1"/>
+          </p:cNvSpPr>
+          <p:nvPr>
+            <p:ph type="sldNum" sz="quarter" idx="5"/>
+          </p:nvPr>
+        </p:nvSpPr>
+        <p:spPr/>
+        <p:txBody>
+          <a:bodyPr/>
+          <a:lstStyle/>
+          <a:p>
+            <a:fld id="{9DCE2504-C28B-4080-B704-27D98903179C}" type="slidenum">
+              <a:rPr lang="en-US" smtClean="0"/>
+              <a:t>10</a:t>
+            </a:fld>
+            <a:endParaRPr lang="en-US"/>
+          </a:p>
+        </p:txBody>
+      </p:sp>
+    </p:spTree>
+    <p:extLst>
+      <p:ext uri="{BB962C8B-B14F-4D97-AF65-F5344CB8AC3E}">
+        <p14:creationId xmlns:p14="http://schemas.microsoft.com/office/powerpoint/2010/main" val="646540768"/>
+      </p:ext>
+    </p:extLst>
+  </p:cSld>
+  <p:clrMapOvr>
+    <a:masterClrMapping/>
+  </p:clrMapOvr>
+</p:notes>
 </file>
 
 <file path=ppt/slideLayouts/slideLayout1.xml><?xml version="1.0" encoding="utf-8"?>
@@ -261,7 +2709,7 @@
             <a:fld id="{3F9AFA87-1417-4992-ABD9-27C3BC8CC883}" type="datetimeFigureOut">
               <a:rPr lang="en-US" smtClean="0"/>
               <a:pPr algn="r"/>
-              <a:t>10/29/2023</a:t>
+              <a:t>11/4/2023</a:t>
             </a:fld>
             <a:endParaRPr lang="en-US" dirty="0"/>
           </a:p>
@@ -460,7 +2908,7 @@
           <a:p>
             <a:fld id="{3F9AFA87-1417-4992-ABD9-27C3BC8CC883}" type="datetimeFigureOut">
               <a:rPr lang="en-US" smtClean="0"/>
-              <a:t>10/29/2023</a:t>
+              <a:t>11/4/2023</a:t>
             </a:fld>
             <a:endParaRPr lang="en-US"/>
           </a:p>
@@ -668,7 +3116,7 @@
           <a:p>
             <a:fld id="{3F9AFA87-1417-4992-ABD9-27C3BC8CC883}" type="datetimeFigureOut">
               <a:rPr lang="en-US" smtClean="0"/>
-              <a:t>10/29/2023</a:t>
+              <a:t>11/4/2023</a:t>
             </a:fld>
             <a:endParaRPr lang="en-US"/>
           </a:p>
@@ -866,7 +3314,7 @@
           <a:p>
             <a:fld id="{3F9AFA87-1417-4992-ABD9-27C3BC8CC883}" type="datetimeFigureOut">
               <a:rPr lang="en-US" smtClean="0"/>
-              <a:t>10/29/2023</a:t>
+              <a:t>11/4/2023</a:t>
             </a:fld>
             <a:endParaRPr lang="en-US"/>
           </a:p>
@@ -1141,7 +3589,7 @@
           <a:p>
             <a:fld id="{3F9AFA87-1417-4992-ABD9-27C3BC8CC883}" type="datetimeFigureOut">
               <a:rPr lang="en-US" smtClean="0"/>
-              <a:t>10/29/2023</a:t>
+              <a:t>11/4/2023</a:t>
             </a:fld>
             <a:endParaRPr lang="en-US"/>
           </a:p>
@@ -1406,7 +3854,7 @@
           <a:p>
             <a:fld id="{3F9AFA87-1417-4992-ABD9-27C3BC8CC883}" type="datetimeFigureOut">
               <a:rPr lang="en-US" smtClean="0"/>
-              <a:t>10/29/2023</a:t>
+              <a:t>11/4/2023</a:t>
             </a:fld>
             <a:endParaRPr lang="en-US" dirty="0"/>
           </a:p>
@@ -1818,7 +4266,7 @@
           <a:p>
             <a:fld id="{3F9AFA87-1417-4992-ABD9-27C3BC8CC883}" type="datetimeFigureOut">
               <a:rPr lang="en-US" smtClean="0"/>
-              <a:t>10/29/2023</a:t>
+              <a:t>11/4/2023</a:t>
             </a:fld>
             <a:endParaRPr lang="en-US"/>
           </a:p>
@@ -1959,7 +4407,7 @@
           <a:p>
             <a:fld id="{3F9AFA87-1417-4992-ABD9-27C3BC8CC883}" type="datetimeFigureOut">
               <a:rPr lang="en-US" smtClean="0"/>
-              <a:t>10/29/2023</a:t>
+              <a:t>11/4/2023</a:t>
             </a:fld>
             <a:endParaRPr lang="en-US"/>
           </a:p>
@@ -2072,7 +4520,7 @@
           <a:p>
             <a:fld id="{3F9AFA87-1417-4992-ABD9-27C3BC8CC883}" type="datetimeFigureOut">
               <a:rPr lang="en-US" smtClean="0"/>
-              <a:t>10/29/2023</a:t>
+              <a:t>11/4/2023</a:t>
             </a:fld>
             <a:endParaRPr lang="en-US"/>
           </a:p>
@@ -2383,7 +4831,7 @@
           <a:p>
             <a:fld id="{3F9AFA87-1417-4992-ABD9-27C3BC8CC883}" type="datetimeFigureOut">
               <a:rPr lang="en-US" smtClean="0"/>
-              <a:t>10/29/2023</a:t>
+              <a:t>11/4/2023</a:t>
             </a:fld>
             <a:endParaRPr lang="en-US"/>
           </a:p>
@@ -2671,7 +5119,7 @@
           <a:p>
             <a:fld id="{3F9AFA87-1417-4992-ABD9-27C3BC8CC883}" type="datetimeFigureOut">
               <a:rPr lang="en-US" smtClean="0"/>
-              <a:t>10/29/2023</a:t>
+              <a:t>11/4/2023</a:t>
             </a:fld>
             <a:endParaRPr lang="en-US"/>
           </a:p>
@@ -2914,7 +5362,7 @@
             <a:fld id="{3F9AFA87-1417-4992-ABD9-27C3BC8CC883}" type="datetimeFigureOut">
               <a:rPr lang="en-US" smtClean="0"/>
               <a:pPr algn="r"/>
-              <a:t>10/29/2023</a:t>
+              <a:t>11/4/2023</a:t>
             </a:fld>
             <a:endParaRPr lang="en-US" dirty="0"/>
           </a:p>
@@ -3656,6 +6104,411 @@
 </p:sld>
 </file>
 
+<file path=ppt/slides/slide10.xml><?xml version="1.0" encoding="utf-8"?>
+<p:sld xmlns:a="http://schemas.openxmlformats.org/drawingml/2006/main" xmlns:r="http://schemas.openxmlformats.org/officeDocument/2006/relationships" xmlns:p="http://schemas.openxmlformats.org/presentationml/2006/main">
+  <p:cSld>
+    <p:spTree>
+      <p:nvGrpSpPr>
+        <p:cNvPr id="1" name=""/>
+        <p:cNvGrpSpPr/>
+        <p:nvPr/>
+      </p:nvGrpSpPr>
+      <p:grpSpPr>
+        <a:xfrm>
+          <a:off x="0" y="0"/>
+          <a:ext cx="0" cy="0"/>
+          <a:chOff x="0" y="0"/>
+          <a:chExt cx="0" cy="0"/>
+        </a:xfrm>
+      </p:grpSpPr>
+      <p:sp>
+        <p:nvSpPr>
+          <p:cNvPr id="2" name="Title 1">
+            <a:extLst>
+              <a:ext uri="{FF2B5EF4-FFF2-40B4-BE49-F238E27FC236}">
+                <a16:creationId xmlns:a16="http://schemas.microsoft.com/office/drawing/2014/main" id="{7FA25AA5-C759-5E79-4523-8B03AB9BF860}"/>
+              </a:ext>
+            </a:extLst>
+          </p:cNvPr>
+          <p:cNvSpPr>
+            <a:spLocks noGrp="1"/>
+          </p:cNvSpPr>
+          <p:nvPr>
+            <p:ph type="title"/>
+          </p:nvPr>
+        </p:nvSpPr>
+        <p:spPr/>
+        <p:txBody>
+          <a:bodyPr/>
+          <a:lstStyle/>
+          <a:p>
+            <a:endParaRPr lang="en-US"/>
+          </a:p>
+        </p:txBody>
+      </p:sp>
+      <p:sp>
+        <p:nvSpPr>
+          <p:cNvPr id="3" name="Content Placeholder 2">
+            <a:extLst>
+              <a:ext uri="{FF2B5EF4-FFF2-40B4-BE49-F238E27FC236}">
+                <a16:creationId xmlns:a16="http://schemas.microsoft.com/office/drawing/2014/main" id="{AF06D14B-0AD8-F669-BB9A-20ECD8DF170B}"/>
+              </a:ext>
+            </a:extLst>
+          </p:cNvPr>
+          <p:cNvSpPr>
+            <a:spLocks noGrp="1"/>
+          </p:cNvSpPr>
+          <p:nvPr>
+            <p:ph idx="1"/>
+          </p:nvPr>
+        </p:nvSpPr>
+        <p:spPr/>
+        <p:txBody>
+          <a:bodyPr/>
+          <a:lstStyle/>
+          <a:p>
+            <a:endParaRPr lang="en-US"/>
+          </a:p>
+        </p:txBody>
+      </p:sp>
+      <p:pic>
+        <p:nvPicPr>
+          <p:cNvPr id="5" name="Picture 4">
+            <a:extLst>
+              <a:ext uri="{FF2B5EF4-FFF2-40B4-BE49-F238E27FC236}">
+                <a16:creationId xmlns:a16="http://schemas.microsoft.com/office/drawing/2014/main" id="{D3537B27-607E-A7D7-F25E-70B49D1A9B81}"/>
+              </a:ext>
+            </a:extLst>
+          </p:cNvPr>
+          <p:cNvPicPr>
+            <a:picLocks noChangeAspect="1"/>
+          </p:cNvPicPr>
+          <p:nvPr/>
+        </p:nvPicPr>
+        <p:blipFill>
+          <a:blip r:embed="rId3"/>
+          <a:stretch>
+            <a:fillRect/>
+          </a:stretch>
+        </p:blipFill>
+        <p:spPr>
+          <a:xfrm>
+            <a:off x="838200" y="0"/>
+            <a:ext cx="10515600" cy="6858000"/>
+          </a:xfrm>
+          <a:prstGeom prst="rect">
+            <a:avLst/>
+          </a:prstGeom>
+        </p:spPr>
+      </p:pic>
+    </p:spTree>
+    <p:extLst>
+      <p:ext uri="{BB962C8B-B14F-4D97-AF65-F5344CB8AC3E}">
+        <p14:creationId xmlns:p14="http://schemas.microsoft.com/office/powerpoint/2010/main" val="2380008530"/>
+      </p:ext>
+    </p:extLst>
+  </p:cSld>
+  <p:clrMapOvr>
+    <a:masterClrMapping/>
+  </p:clrMapOvr>
+</p:sld>
+</file>
+
+<file path=ppt/slides/slide11.xml><?xml version="1.0" encoding="utf-8"?>
+<p:sld xmlns:a="http://schemas.openxmlformats.org/drawingml/2006/main" xmlns:r="http://schemas.openxmlformats.org/officeDocument/2006/relationships" xmlns:p="http://schemas.openxmlformats.org/presentationml/2006/main">
+  <p:cSld>
+    <p:spTree>
+      <p:nvGrpSpPr>
+        <p:cNvPr id="1" name=""/>
+        <p:cNvGrpSpPr/>
+        <p:nvPr/>
+      </p:nvGrpSpPr>
+      <p:grpSpPr>
+        <a:xfrm>
+          <a:off x="0" y="0"/>
+          <a:ext cx="0" cy="0"/>
+          <a:chOff x="0" y="0"/>
+          <a:chExt cx="0" cy="0"/>
+        </a:xfrm>
+      </p:grpSpPr>
+      <p:sp>
+        <p:nvSpPr>
+          <p:cNvPr id="2" name="Title 1">
+            <a:extLst>
+              <a:ext uri="{FF2B5EF4-FFF2-40B4-BE49-F238E27FC236}">
+                <a16:creationId xmlns:a16="http://schemas.microsoft.com/office/drawing/2014/main" id="{9F28DE6E-F44E-8EED-1FBB-2A815B26DDE3}"/>
+              </a:ext>
+            </a:extLst>
+          </p:cNvPr>
+          <p:cNvSpPr>
+            <a:spLocks noGrp="1"/>
+          </p:cNvSpPr>
+          <p:nvPr>
+            <p:ph type="title"/>
+          </p:nvPr>
+        </p:nvSpPr>
+        <p:spPr/>
+        <p:txBody>
+          <a:bodyPr/>
+          <a:lstStyle/>
+          <a:p>
+            <a:r>
+              <a:rPr lang="en-US" dirty="0"/>
+              <a:t>Current Site Weather API from API Ninja</a:t>
+            </a:r>
+          </a:p>
+        </p:txBody>
+      </p:sp>
+      <p:sp>
+        <p:nvSpPr>
+          <p:cNvPr id="3" name="Content Placeholder 2">
+            <a:extLst>
+              <a:ext uri="{FF2B5EF4-FFF2-40B4-BE49-F238E27FC236}">
+                <a16:creationId xmlns:a16="http://schemas.microsoft.com/office/drawing/2014/main" id="{C06F2B81-231A-71FE-48A4-8EF5EBED1588}"/>
+              </a:ext>
+            </a:extLst>
+          </p:cNvPr>
+          <p:cNvSpPr>
+            <a:spLocks noGrp="1"/>
+          </p:cNvSpPr>
+          <p:nvPr>
+            <p:ph idx="1"/>
+          </p:nvPr>
+        </p:nvSpPr>
+        <p:spPr/>
+        <p:txBody>
+          <a:bodyPr/>
+          <a:lstStyle/>
+          <a:p>
+            <a:r>
+              <a:rPr lang="en-US" dirty="0"/>
+              <a:t>Request weather information for a specific Zip code, convert from Celsius to Fahrenheit then push the results to the DOM</a:t>
+            </a:r>
+          </a:p>
+        </p:txBody>
+      </p:sp>
+      <p:pic>
+        <p:nvPicPr>
+          <p:cNvPr id="5" name="Picture 4">
+            <a:extLst>
+              <a:ext uri="{FF2B5EF4-FFF2-40B4-BE49-F238E27FC236}">
+                <a16:creationId xmlns:a16="http://schemas.microsoft.com/office/drawing/2014/main" id="{596E4137-730A-2246-BD16-84611B2554BE}"/>
+              </a:ext>
+            </a:extLst>
+          </p:cNvPr>
+          <p:cNvPicPr>
+            <a:picLocks noChangeAspect="1"/>
+          </p:cNvPicPr>
+          <p:nvPr/>
+        </p:nvPicPr>
+        <p:blipFill>
+          <a:blip r:embed="rId3"/>
+          <a:stretch>
+            <a:fillRect/>
+          </a:stretch>
+        </p:blipFill>
+        <p:spPr>
+          <a:xfrm>
+            <a:off x="0" y="2696832"/>
+            <a:ext cx="6287045" cy="2400508"/>
+          </a:xfrm>
+          <a:prstGeom prst="rect">
+            <a:avLst/>
+          </a:prstGeom>
+        </p:spPr>
+      </p:pic>
+      <p:pic>
+        <p:nvPicPr>
+          <p:cNvPr id="7" name="Picture 6">
+            <a:extLst>
+              <a:ext uri="{FF2B5EF4-FFF2-40B4-BE49-F238E27FC236}">
+                <a16:creationId xmlns:a16="http://schemas.microsoft.com/office/drawing/2014/main" id="{2BC6DE62-73A1-9F3A-593E-6A56A9E54F02}"/>
+              </a:ext>
+            </a:extLst>
+          </p:cNvPr>
+          <p:cNvPicPr>
+            <a:picLocks noChangeAspect="1"/>
+          </p:cNvPicPr>
+          <p:nvPr/>
+        </p:nvPicPr>
+        <p:blipFill>
+          <a:blip r:embed="rId4"/>
+          <a:stretch>
+            <a:fillRect/>
+          </a:stretch>
+        </p:blipFill>
+        <p:spPr>
+          <a:xfrm>
+            <a:off x="4005942" y="3266487"/>
+            <a:ext cx="7960001" cy="3450288"/>
+          </a:xfrm>
+          <a:prstGeom prst="rect">
+            <a:avLst/>
+          </a:prstGeom>
+        </p:spPr>
+      </p:pic>
+    </p:spTree>
+    <p:extLst>
+      <p:ext uri="{BB962C8B-B14F-4D97-AF65-F5344CB8AC3E}">
+        <p14:creationId xmlns:p14="http://schemas.microsoft.com/office/powerpoint/2010/main" val="3824809652"/>
+      </p:ext>
+    </p:extLst>
+  </p:cSld>
+  <p:clrMapOvr>
+    <a:masterClrMapping/>
+  </p:clrMapOvr>
+</p:sld>
+</file>
+
+<file path=ppt/slides/slide12.xml><?xml version="1.0" encoding="utf-8"?>
+<p:sld xmlns:a="http://schemas.openxmlformats.org/drawingml/2006/main" xmlns:r="http://schemas.openxmlformats.org/officeDocument/2006/relationships" xmlns:p="http://schemas.openxmlformats.org/presentationml/2006/main">
+  <p:cSld>
+    <p:spTree>
+      <p:nvGrpSpPr>
+        <p:cNvPr id="1" name=""/>
+        <p:cNvGrpSpPr/>
+        <p:nvPr/>
+      </p:nvGrpSpPr>
+      <p:grpSpPr>
+        <a:xfrm>
+          <a:off x="0" y="0"/>
+          <a:ext cx="0" cy="0"/>
+          <a:chOff x="0" y="0"/>
+          <a:chExt cx="0" cy="0"/>
+        </a:xfrm>
+      </p:grpSpPr>
+      <p:pic>
+        <p:nvPicPr>
+          <p:cNvPr id="5" name="Content Placeholder 4">
+            <a:extLst>
+              <a:ext uri="{FF2B5EF4-FFF2-40B4-BE49-F238E27FC236}">
+                <a16:creationId xmlns:a16="http://schemas.microsoft.com/office/drawing/2014/main" id="{E92F4B1B-94DC-DE8F-6F20-ADA91E4E8E79}"/>
+              </a:ext>
+            </a:extLst>
+          </p:cNvPr>
+          <p:cNvPicPr>
+            <a:picLocks noGrp="1" noChangeAspect="1"/>
+          </p:cNvPicPr>
+          <p:nvPr>
+            <p:ph idx="1"/>
+          </p:nvPr>
+        </p:nvPicPr>
+        <p:blipFill>
+          <a:blip r:embed="rId3"/>
+          <a:stretch>
+            <a:fillRect/>
+          </a:stretch>
+        </p:blipFill>
+        <p:spPr>
+          <a:xfrm>
+            <a:off x="457201" y="335535"/>
+            <a:ext cx="8985490" cy="5841428"/>
+          </a:xfrm>
+        </p:spPr>
+      </p:pic>
+    </p:spTree>
+    <p:extLst>
+      <p:ext uri="{BB962C8B-B14F-4D97-AF65-F5344CB8AC3E}">
+        <p14:creationId xmlns:p14="http://schemas.microsoft.com/office/powerpoint/2010/main" val="2117840071"/>
+      </p:ext>
+    </p:extLst>
+  </p:cSld>
+  <p:clrMapOvr>
+    <a:masterClrMapping/>
+  </p:clrMapOvr>
+</p:sld>
+</file>
+
+<file path=ppt/slides/slide13.xml><?xml version="1.0" encoding="utf-8"?>
+<p:sld xmlns:a="http://schemas.openxmlformats.org/drawingml/2006/main" xmlns:r="http://schemas.openxmlformats.org/officeDocument/2006/relationships" xmlns:p="http://schemas.openxmlformats.org/presentationml/2006/main">
+  <p:cSld>
+    <p:spTree>
+      <p:nvGrpSpPr>
+        <p:cNvPr id="1" name=""/>
+        <p:cNvGrpSpPr/>
+        <p:nvPr/>
+      </p:nvGrpSpPr>
+      <p:grpSpPr>
+        <a:xfrm>
+          <a:off x="0" y="0"/>
+          <a:ext cx="0" cy="0"/>
+          <a:chOff x="0" y="0"/>
+          <a:chExt cx="0" cy="0"/>
+        </a:xfrm>
+      </p:grpSpPr>
+      <p:sp>
+        <p:nvSpPr>
+          <p:cNvPr id="3" name="Content Placeholder 2">
+            <a:extLst>
+              <a:ext uri="{FF2B5EF4-FFF2-40B4-BE49-F238E27FC236}">
+                <a16:creationId xmlns:a16="http://schemas.microsoft.com/office/drawing/2014/main" id="{FEC61B75-D506-5DCF-5E17-2682EE65B374}"/>
+              </a:ext>
+            </a:extLst>
+          </p:cNvPr>
+          <p:cNvSpPr>
+            <a:spLocks noGrp="1"/>
+          </p:cNvSpPr>
+          <p:nvPr>
+            <p:ph idx="1"/>
+          </p:nvPr>
+        </p:nvSpPr>
+        <p:spPr>
+          <a:xfrm>
+            <a:off x="757646" y="461554"/>
+            <a:ext cx="10596154" cy="5715409"/>
+          </a:xfrm>
+        </p:spPr>
+        <p:txBody>
+          <a:bodyPr/>
+          <a:lstStyle/>
+          <a:p>
+            <a:pPr marL="0" indent="0" algn="ctr">
+              <a:buNone/>
+            </a:pPr>
+            <a:endParaRPr lang="en-US" dirty="0"/>
+          </a:p>
+          <a:p>
+            <a:pPr marL="0" indent="0" algn="ctr">
+              <a:buNone/>
+            </a:pPr>
+            <a:endParaRPr lang="en-US" dirty="0"/>
+          </a:p>
+          <a:p>
+            <a:pPr marL="0" indent="0" algn="ctr">
+              <a:buNone/>
+            </a:pPr>
+            <a:endParaRPr lang="en-US" dirty="0"/>
+          </a:p>
+          <a:p>
+            <a:pPr marL="0" indent="0" algn="ctr">
+              <a:buNone/>
+            </a:pPr>
+            <a:endParaRPr lang="en-US" dirty="0"/>
+          </a:p>
+          <a:p>
+            <a:pPr marL="0" indent="0" algn="ctr">
+              <a:buNone/>
+            </a:pPr>
+            <a:r>
+              <a:rPr lang="en-US" dirty="0"/>
+              <a:t>If you have any questions please reach out to me!</a:t>
+            </a:r>
+          </a:p>
+        </p:txBody>
+      </p:sp>
+    </p:spTree>
+    <p:extLst>
+      <p:ext uri="{BB962C8B-B14F-4D97-AF65-F5344CB8AC3E}">
+        <p14:creationId xmlns:p14="http://schemas.microsoft.com/office/powerpoint/2010/main" val="1976297779"/>
+      </p:ext>
+    </p:extLst>
+  </p:cSld>
+  <p:clrMapOvr>
+    <a:masterClrMapping/>
+  </p:clrMapOvr>
+</p:sld>
+</file>
+
 <file path=ppt/slides/slide2.xml><?xml version="1.0" encoding="utf-8"?>
 <p:sld xmlns:a="http://schemas.openxmlformats.org/drawingml/2006/main" xmlns:r="http://schemas.openxmlformats.org/officeDocument/2006/relationships" xmlns:p="http://schemas.openxmlformats.org/presentationml/2006/main">
   <p:cSld>
@@ -3766,7 +6619,7 @@
                 <a:ea typeface="Calibri" panose="020F0502020204030204" pitchFamily="34" charset="0"/>
                 <a:cs typeface="Times New Roman" panose="02020603050405020304" pitchFamily="18" charset="0"/>
               </a:rPr>
-              <a:t>Triggered Event, usually server based push</a:t>
+              <a:t>Triggered Event, usually server-based push</a:t>
             </a:r>
           </a:p>
           <a:p>
@@ -3917,11 +6770,18 @@
               <a:buNone/>
             </a:pPr>
             <a:r>
+              <a:rPr lang="en-US" sz="1800" b="1" kern="100" dirty="0">
+                <a:latin typeface="Calibri" panose="020F0502020204030204" pitchFamily="34" charset="0"/>
+                <a:cs typeface="Times New Roman" panose="02020603050405020304" pitchFamily="18" charset="0"/>
+              </a:rPr>
+              <a:t>Other Models </a:t>
+            </a:r>
+            <a:r>
               <a:rPr lang="en-US" sz="1800" kern="100" dirty="0">
                 <a:latin typeface="Calibri" panose="020F0502020204030204" pitchFamily="34" charset="0"/>
                 <a:cs typeface="Times New Roman" panose="02020603050405020304" pitchFamily="18" charset="0"/>
               </a:rPr>
-              <a:t>Other Models – </a:t>
+              <a:t>– </a:t>
             </a:r>
             <a:r>
               <a:rPr lang="en-US" sz="1800" b="1" kern="100" dirty="0" err="1">
@@ -6321,6 +9181,331 @@
     <p:extLst>
       <p:ext uri="{BB962C8B-B14F-4D97-AF65-F5344CB8AC3E}">
         <p14:creationId xmlns:p14="http://schemas.microsoft.com/office/powerpoint/2010/main" val="1492452663"/>
+      </p:ext>
+    </p:extLst>
+  </p:cSld>
+  <p:clrMapOvr>
+    <a:masterClrMapping/>
+  </p:clrMapOvr>
+</p:sld>
+</file>
+
+<file path=ppt/slides/slide7.xml><?xml version="1.0" encoding="utf-8"?>
+<p:sld xmlns:a="http://schemas.openxmlformats.org/drawingml/2006/main" xmlns:r="http://schemas.openxmlformats.org/officeDocument/2006/relationships" xmlns:p="http://schemas.openxmlformats.org/presentationml/2006/main">
+  <p:cSld>
+    <p:spTree>
+      <p:nvGrpSpPr>
+        <p:cNvPr id="1" name=""/>
+        <p:cNvGrpSpPr/>
+        <p:nvPr/>
+      </p:nvGrpSpPr>
+      <p:grpSpPr>
+        <a:xfrm>
+          <a:off x="0" y="0"/>
+          <a:ext cx="0" cy="0"/>
+          <a:chOff x="0" y="0"/>
+          <a:chExt cx="0" cy="0"/>
+        </a:xfrm>
+      </p:grpSpPr>
+      <p:sp>
+        <p:nvSpPr>
+          <p:cNvPr id="2" name="Title 1">
+            <a:extLst>
+              <a:ext uri="{FF2B5EF4-FFF2-40B4-BE49-F238E27FC236}">
+                <a16:creationId xmlns:a16="http://schemas.microsoft.com/office/drawing/2014/main" id="{8F11D1AF-39AA-7D58-A5DC-FCD221B8AAC6}"/>
+              </a:ext>
+            </a:extLst>
+          </p:cNvPr>
+          <p:cNvSpPr>
+            <a:spLocks noGrp="1"/>
+          </p:cNvSpPr>
+          <p:nvPr>
+            <p:ph type="title"/>
+          </p:nvPr>
+        </p:nvSpPr>
+        <p:spPr/>
+        <p:txBody>
+          <a:bodyPr/>
+          <a:lstStyle/>
+          <a:p>
+            <a:r>
+              <a:rPr lang="en-US" dirty="0"/>
+              <a:t>Plant Equipment Status</a:t>
+            </a:r>
+          </a:p>
+        </p:txBody>
+      </p:sp>
+      <p:pic>
+        <p:nvPicPr>
+          <p:cNvPr id="5" name="Content Placeholder 4">
+            <a:extLst>
+              <a:ext uri="{FF2B5EF4-FFF2-40B4-BE49-F238E27FC236}">
+                <a16:creationId xmlns:a16="http://schemas.microsoft.com/office/drawing/2014/main" id="{744E1FD4-777B-9885-73B1-E5BB6C825268}"/>
+              </a:ext>
+            </a:extLst>
+          </p:cNvPr>
+          <p:cNvPicPr>
+            <a:picLocks noGrp="1" noChangeAspect="1"/>
+          </p:cNvPicPr>
+          <p:nvPr>
+            <p:ph idx="1"/>
+          </p:nvPr>
+        </p:nvPicPr>
+        <p:blipFill>
+          <a:blip r:embed="rId3"/>
+          <a:stretch>
+            <a:fillRect/>
+          </a:stretch>
+        </p:blipFill>
+        <p:spPr>
+          <a:xfrm>
+            <a:off x="2517802" y="1872343"/>
+            <a:ext cx="6909228" cy="4517571"/>
+          </a:xfrm>
+        </p:spPr>
+      </p:pic>
+    </p:spTree>
+    <p:extLst>
+      <p:ext uri="{BB962C8B-B14F-4D97-AF65-F5344CB8AC3E}">
+        <p14:creationId xmlns:p14="http://schemas.microsoft.com/office/powerpoint/2010/main" val="2420770833"/>
+      </p:ext>
+    </p:extLst>
+  </p:cSld>
+  <p:clrMapOvr>
+    <a:masterClrMapping/>
+  </p:clrMapOvr>
+</p:sld>
+</file>
+
+<file path=ppt/slides/slide8.xml><?xml version="1.0" encoding="utf-8"?>
+<p:sld xmlns:a="http://schemas.openxmlformats.org/drawingml/2006/main" xmlns:r="http://schemas.openxmlformats.org/officeDocument/2006/relationships" xmlns:p="http://schemas.openxmlformats.org/presentationml/2006/main">
+  <p:cSld>
+    <p:spTree>
+      <p:nvGrpSpPr>
+        <p:cNvPr id="1" name=""/>
+        <p:cNvGrpSpPr/>
+        <p:nvPr/>
+      </p:nvGrpSpPr>
+      <p:grpSpPr>
+        <a:xfrm>
+          <a:off x="0" y="0"/>
+          <a:ext cx="0" cy="0"/>
+          <a:chOff x="0" y="0"/>
+          <a:chExt cx="0" cy="0"/>
+        </a:xfrm>
+      </p:grpSpPr>
+      <p:sp>
+        <p:nvSpPr>
+          <p:cNvPr id="2" name="Title 1">
+            <a:extLst>
+              <a:ext uri="{FF2B5EF4-FFF2-40B4-BE49-F238E27FC236}">
+                <a16:creationId xmlns:a16="http://schemas.microsoft.com/office/drawing/2014/main" id="{8EAAD1D8-C5FF-54AB-3496-B17A550A0CD3}"/>
+              </a:ext>
+            </a:extLst>
+          </p:cNvPr>
+          <p:cNvSpPr>
+            <a:spLocks noGrp="1"/>
+          </p:cNvSpPr>
+          <p:nvPr>
+            <p:ph type="title"/>
+          </p:nvPr>
+        </p:nvSpPr>
+        <p:spPr>
+          <a:xfrm>
+            <a:off x="370114" y="103867"/>
+            <a:ext cx="10515600" cy="1325563"/>
+          </a:xfrm>
+        </p:spPr>
+        <p:txBody>
+          <a:bodyPr/>
+          <a:lstStyle/>
+          <a:p>
+            <a:r>
+              <a:rPr lang="en-US" dirty="0"/>
+              <a:t>RESTful API’s Usage Power and chemical consumption</a:t>
+            </a:r>
+          </a:p>
+        </p:txBody>
+      </p:sp>
+      <p:pic>
+        <p:nvPicPr>
+          <p:cNvPr id="5" name="Picture 4">
+            <a:extLst>
+              <a:ext uri="{FF2B5EF4-FFF2-40B4-BE49-F238E27FC236}">
+                <a16:creationId xmlns:a16="http://schemas.microsoft.com/office/drawing/2014/main" id="{E4D20993-D5B2-176A-7E31-66E77F93C2BA}"/>
+              </a:ext>
+            </a:extLst>
+          </p:cNvPr>
+          <p:cNvPicPr>
+            <a:picLocks noChangeAspect="1"/>
+          </p:cNvPicPr>
+          <p:nvPr/>
+        </p:nvPicPr>
+        <p:blipFill>
+          <a:blip r:embed="rId3"/>
+          <a:stretch>
+            <a:fillRect/>
+          </a:stretch>
+        </p:blipFill>
+        <p:spPr>
+          <a:xfrm>
+            <a:off x="0" y="1793691"/>
+            <a:ext cx="12192000" cy="3270618"/>
+          </a:xfrm>
+          <a:prstGeom prst="rect">
+            <a:avLst/>
+          </a:prstGeom>
+        </p:spPr>
+      </p:pic>
+    </p:spTree>
+    <p:extLst>
+      <p:ext uri="{BB962C8B-B14F-4D97-AF65-F5344CB8AC3E}">
+        <p14:creationId xmlns:p14="http://schemas.microsoft.com/office/powerpoint/2010/main" val="2851749902"/>
+      </p:ext>
+    </p:extLst>
+  </p:cSld>
+  <p:clrMapOvr>
+    <a:masterClrMapping/>
+  </p:clrMapOvr>
+</p:sld>
+</file>
+
+<file path=ppt/slides/slide9.xml><?xml version="1.0" encoding="utf-8"?>
+<p:sld xmlns:a="http://schemas.openxmlformats.org/drawingml/2006/main" xmlns:r="http://schemas.openxmlformats.org/officeDocument/2006/relationships" xmlns:p="http://schemas.openxmlformats.org/presentationml/2006/main">
+  <p:cSld>
+    <p:spTree>
+      <p:nvGrpSpPr>
+        <p:cNvPr id="1" name=""/>
+        <p:cNvGrpSpPr/>
+        <p:nvPr/>
+      </p:nvGrpSpPr>
+      <p:grpSpPr>
+        <a:xfrm>
+          <a:off x="0" y="0"/>
+          <a:ext cx="0" cy="0"/>
+          <a:chOff x="0" y="0"/>
+          <a:chExt cx="0" cy="0"/>
+        </a:xfrm>
+      </p:grpSpPr>
+      <p:sp>
+        <p:nvSpPr>
+          <p:cNvPr id="2" name="Title 1">
+            <a:extLst>
+              <a:ext uri="{FF2B5EF4-FFF2-40B4-BE49-F238E27FC236}">
+                <a16:creationId xmlns:a16="http://schemas.microsoft.com/office/drawing/2014/main" id="{6B93A805-8516-319D-D0BB-E8035509CEB3}"/>
+              </a:ext>
+            </a:extLst>
+          </p:cNvPr>
+          <p:cNvSpPr>
+            <a:spLocks noGrp="1"/>
+          </p:cNvSpPr>
+          <p:nvPr>
+            <p:ph type="title"/>
+          </p:nvPr>
+        </p:nvSpPr>
+        <p:spPr/>
+        <p:txBody>
+          <a:bodyPr/>
+          <a:lstStyle/>
+          <a:p>
+            <a:r>
+              <a:rPr lang="en-US" dirty="0" err="1"/>
+              <a:t>PokeAPI</a:t>
+            </a:r>
+            <a:endParaRPr lang="en-US" dirty="0"/>
+          </a:p>
+        </p:txBody>
+      </p:sp>
+      <p:sp>
+        <p:nvSpPr>
+          <p:cNvPr id="3" name="Content Placeholder 2">
+            <a:extLst>
+              <a:ext uri="{FF2B5EF4-FFF2-40B4-BE49-F238E27FC236}">
+                <a16:creationId xmlns:a16="http://schemas.microsoft.com/office/drawing/2014/main" id="{DFDF4E68-E33C-ED69-FCEE-065C287BAAF0}"/>
+              </a:ext>
+            </a:extLst>
+          </p:cNvPr>
+          <p:cNvSpPr>
+            <a:spLocks noGrp="1"/>
+          </p:cNvSpPr>
+          <p:nvPr>
+            <p:ph idx="1"/>
+          </p:nvPr>
+        </p:nvSpPr>
+        <p:spPr>
+          <a:xfrm>
+            <a:off x="195942" y="1825625"/>
+            <a:ext cx="10515600" cy="4351338"/>
+          </a:xfrm>
+        </p:spPr>
+        <p:txBody>
+          <a:bodyPr/>
+          <a:lstStyle/>
+          <a:p>
+            <a:r>
+              <a:rPr lang="en-US" dirty="0"/>
+              <a:t>General Database Request </a:t>
+            </a:r>
+          </a:p>
+          <a:p>
+            <a:r>
+              <a:rPr lang="en-US" dirty="0"/>
+              <a:t>Sub request for each specific </a:t>
+            </a:r>
+          </a:p>
+          <a:p>
+            <a:pPr marL="0" indent="0">
+              <a:buNone/>
+            </a:pPr>
+            <a:r>
+              <a:rPr lang="en-US" dirty="0"/>
+              <a:t>   </a:t>
+            </a:r>
+            <a:r>
+              <a:rPr lang="en-US" dirty="0" err="1"/>
+              <a:t>Pokemon</a:t>
+            </a:r>
+            <a:endParaRPr lang="en-US" dirty="0"/>
+          </a:p>
+          <a:p>
+            <a:endParaRPr lang="en-US" dirty="0"/>
+          </a:p>
+        </p:txBody>
+      </p:sp>
+      <p:pic>
+        <p:nvPicPr>
+          <p:cNvPr id="7" name="Picture 6">
+            <a:extLst>
+              <a:ext uri="{FF2B5EF4-FFF2-40B4-BE49-F238E27FC236}">
+                <a16:creationId xmlns:a16="http://schemas.microsoft.com/office/drawing/2014/main" id="{0DA30662-EE20-1AF3-6120-1DEE496388D8}"/>
+              </a:ext>
+            </a:extLst>
+          </p:cNvPr>
+          <p:cNvPicPr>
+            <a:picLocks noChangeAspect="1"/>
+          </p:cNvPicPr>
+          <p:nvPr/>
+        </p:nvPicPr>
+        <p:blipFill>
+          <a:blip r:embed="rId3"/>
+          <a:stretch>
+            <a:fillRect/>
+          </a:stretch>
+        </p:blipFill>
+        <p:spPr>
+          <a:xfrm>
+            <a:off x="4789202" y="0"/>
+            <a:ext cx="7185595" cy="6858000"/>
+          </a:xfrm>
+          <a:prstGeom prst="rect">
+            <a:avLst/>
+          </a:prstGeom>
+        </p:spPr>
+      </p:pic>
+    </p:spTree>
+    <p:extLst>
+      <p:ext uri="{BB962C8B-B14F-4D97-AF65-F5344CB8AC3E}">
+        <p14:creationId xmlns:p14="http://schemas.microsoft.com/office/powerpoint/2010/main" val="2136359060"/>
       </p:ext>
     </p:extLst>
   </p:cSld>
@@ -6623,4 +9808,299 @@
     </a:ext>
   </a:extLst>
 </a:theme>
+</file>
+
+<file path=ppt/theme/theme2.xml><?xml version="1.0" encoding="utf-8"?>
+<a:theme xmlns:a="http://schemas.openxmlformats.org/drawingml/2006/main" name="Office Theme">
+  <a:themeElements>
+    <a:clrScheme name="Office">
+      <a:dk1>
+        <a:sysClr val="windowText" lastClr="000000"/>
+      </a:dk1>
+      <a:lt1>
+        <a:sysClr val="window" lastClr="FFFFFF"/>
+      </a:lt1>
+      <a:dk2>
+        <a:srgbClr val="44546A"/>
+      </a:dk2>
+      <a:lt2>
+        <a:srgbClr val="E7E6E6"/>
+      </a:lt2>
+      <a:accent1>
+        <a:srgbClr val="4472C4"/>
+      </a:accent1>
+      <a:accent2>
+        <a:srgbClr val="ED7D31"/>
+      </a:accent2>
+      <a:accent3>
+        <a:srgbClr val="A5A5A5"/>
+      </a:accent3>
+      <a:accent4>
+        <a:srgbClr val="FFC000"/>
+      </a:accent4>
+      <a:accent5>
+        <a:srgbClr val="5B9BD5"/>
+      </a:accent5>
+      <a:accent6>
+        <a:srgbClr val="70AD47"/>
+      </a:accent6>
+      <a:hlink>
+        <a:srgbClr val="0563C1"/>
+      </a:hlink>
+      <a:folHlink>
+        <a:srgbClr val="954F72"/>
+      </a:folHlink>
+    </a:clrScheme>
+    <a:fontScheme name="Office">
+      <a:majorFont>
+        <a:latin typeface="Calibri Light" panose="020F0302020204030204"/>
+        <a:ea typeface=""/>
+        <a:cs typeface=""/>
+        <a:font script="Jpan" typeface="游ゴシック Light"/>
+        <a:font script="Hang" typeface="맑은 고딕"/>
+        <a:font script="Hans" typeface="等线 Light"/>
+        <a:font script="Hant" typeface="新細明體"/>
+        <a:font script="Arab" typeface="Times New Roman"/>
+        <a:font script="Hebr" typeface="Times New Roman"/>
+        <a:font script="Thai" typeface="Angsana New"/>
+        <a:font script="Ethi" typeface="Nyala"/>
+        <a:font script="Beng" typeface="Vrinda"/>
+        <a:font script="Gujr" typeface="Shruti"/>
+        <a:font script="Khmr" typeface="MoolBoran"/>
+        <a:font script="Knda" typeface="Tunga"/>
+        <a:font script="Guru" typeface="Raavi"/>
+        <a:font script="Cans" typeface="Euphemia"/>
+        <a:font script="Cher" typeface="Plantagenet Cherokee"/>
+        <a:font script="Yiii" typeface="Microsoft Yi Baiti"/>
+        <a:font script="Tibt" typeface="Microsoft Himalaya"/>
+        <a:font script="Thaa" typeface="MV Boli"/>
+        <a:font script="Deva" typeface="Mangal"/>
+        <a:font script="Telu" typeface="Gautami"/>
+        <a:font script="Taml" typeface="Latha"/>
+        <a:font script="Syrc" typeface="Estrangelo Edessa"/>
+        <a:font script="Orya" typeface="Kalinga"/>
+        <a:font script="Mlym" typeface="Kartika"/>
+        <a:font script="Laoo" typeface="DokChampa"/>
+        <a:font script="Sinh" typeface="Iskoola Pota"/>
+        <a:font script="Mong" typeface="Mongolian Baiti"/>
+        <a:font script="Viet" typeface="Times New Roman"/>
+        <a:font script="Uigh" typeface="Microsoft Uighur"/>
+        <a:font script="Geor" typeface="Sylfaen"/>
+        <a:font script="Armn" typeface="Arial"/>
+        <a:font script="Bugi" typeface="Leelawadee UI"/>
+        <a:font script="Bopo" typeface="Microsoft JhengHei"/>
+        <a:font script="Java" typeface="Javanese Text"/>
+        <a:font script="Lisu" typeface="Segoe UI"/>
+        <a:font script="Mymr" typeface="Myanmar Text"/>
+        <a:font script="Nkoo" typeface="Ebrima"/>
+        <a:font script="Olck" typeface="Nirmala UI"/>
+        <a:font script="Osma" typeface="Ebrima"/>
+        <a:font script="Phag" typeface="Phagspa"/>
+        <a:font script="Syrn" typeface="Estrangelo Edessa"/>
+        <a:font script="Syrj" typeface="Estrangelo Edessa"/>
+        <a:font script="Syre" typeface="Estrangelo Edessa"/>
+        <a:font script="Sora" typeface="Nirmala UI"/>
+        <a:font script="Tale" typeface="Microsoft Tai Le"/>
+        <a:font script="Talu" typeface="Microsoft New Tai Lue"/>
+        <a:font script="Tfng" typeface="Ebrima"/>
+      </a:majorFont>
+      <a:minorFont>
+        <a:latin typeface="Calibri" panose="020F0502020204030204"/>
+        <a:ea typeface=""/>
+        <a:cs typeface=""/>
+        <a:font script="Jpan" typeface="游ゴシック"/>
+        <a:font script="Hang" typeface="맑은 고딕"/>
+        <a:font script="Hans" typeface="等线"/>
+        <a:font script="Hant" typeface="新細明體"/>
+        <a:font script="Arab" typeface="Arial"/>
+        <a:font script="Hebr" typeface="Arial"/>
+        <a:font script="Thai" typeface="Cordia New"/>
+        <a:font script="Ethi" typeface="Nyala"/>
+        <a:font script="Beng" typeface="Vrinda"/>
+        <a:font script="Gujr" typeface="Shruti"/>
+        <a:font script="Khmr" typeface="DaunPenh"/>
+        <a:font script="Knda" typeface="Tunga"/>
+        <a:font script="Guru" typeface="Raavi"/>
+        <a:font script="Cans" typeface="Euphemia"/>
+        <a:font script="Cher" typeface="Plantagenet Cherokee"/>
+        <a:font script="Yiii" typeface="Microsoft Yi Baiti"/>
+        <a:font script="Tibt" typeface="Microsoft Himalaya"/>
+        <a:font script="Thaa" typeface="MV Boli"/>
+        <a:font script="Deva" typeface="Mangal"/>
+        <a:font script="Telu" typeface="Gautami"/>
+        <a:font script="Taml" typeface="Latha"/>
+        <a:font script="Syrc" typeface="Estrangelo Edessa"/>
+        <a:font script="Orya" typeface="Kalinga"/>
+        <a:font script="Mlym" typeface="Kartika"/>
+        <a:font script="Laoo" typeface="DokChampa"/>
+        <a:font script="Sinh" typeface="Iskoola Pota"/>
+        <a:font script="Mong" typeface="Mongolian Baiti"/>
+        <a:font script="Viet" typeface="Arial"/>
+        <a:font script="Uigh" typeface="Microsoft Uighur"/>
+        <a:font script="Geor" typeface="Sylfaen"/>
+        <a:font script="Armn" typeface="Arial"/>
+        <a:font script="Bugi" typeface="Leelawadee UI"/>
+        <a:font script="Bopo" typeface="Microsoft JhengHei"/>
+        <a:font script="Java" typeface="Javanese Text"/>
+        <a:font script="Lisu" typeface="Segoe UI"/>
+        <a:font script="Mymr" typeface="Myanmar Text"/>
+        <a:font script="Nkoo" typeface="Ebrima"/>
+        <a:font script="Olck" typeface="Nirmala UI"/>
+        <a:font script="Osma" typeface="Ebrima"/>
+        <a:font script="Phag" typeface="Phagspa"/>
+        <a:font script="Syrn" typeface="Estrangelo Edessa"/>
+        <a:font script="Syrj" typeface="Estrangelo Edessa"/>
+        <a:font script="Syre" typeface="Estrangelo Edessa"/>
+        <a:font script="Sora" typeface="Nirmala UI"/>
+        <a:font script="Tale" typeface="Microsoft Tai Le"/>
+        <a:font script="Talu" typeface="Microsoft New Tai Lue"/>
+        <a:font script="Tfng" typeface="Ebrima"/>
+      </a:minorFont>
+    </a:fontScheme>
+    <a:fmtScheme name="Office">
+      <a:fillStyleLst>
+        <a:solidFill>
+          <a:schemeClr val="phClr"/>
+        </a:solidFill>
+        <a:gradFill rotWithShape="1">
+          <a:gsLst>
+            <a:gs pos="0">
+              <a:schemeClr val="phClr">
+                <a:lumMod val="110000"/>
+                <a:satMod val="105000"/>
+                <a:tint val="67000"/>
+              </a:schemeClr>
+            </a:gs>
+            <a:gs pos="50000">
+              <a:schemeClr val="phClr">
+                <a:lumMod val="105000"/>
+                <a:satMod val="103000"/>
+                <a:tint val="73000"/>
+              </a:schemeClr>
+            </a:gs>
+            <a:gs pos="100000">
+              <a:schemeClr val="phClr">
+                <a:lumMod val="105000"/>
+                <a:satMod val="109000"/>
+                <a:tint val="81000"/>
+              </a:schemeClr>
+            </a:gs>
+          </a:gsLst>
+          <a:lin ang="5400000" scaled="0"/>
+        </a:gradFill>
+        <a:gradFill rotWithShape="1">
+          <a:gsLst>
+            <a:gs pos="0">
+              <a:schemeClr val="phClr">
+                <a:satMod val="103000"/>
+                <a:lumMod val="102000"/>
+                <a:tint val="94000"/>
+              </a:schemeClr>
+            </a:gs>
+            <a:gs pos="50000">
+              <a:schemeClr val="phClr">
+                <a:satMod val="110000"/>
+                <a:lumMod val="100000"/>
+                <a:shade val="100000"/>
+              </a:schemeClr>
+            </a:gs>
+            <a:gs pos="100000">
+              <a:schemeClr val="phClr">
+                <a:lumMod val="99000"/>
+                <a:satMod val="120000"/>
+                <a:shade val="78000"/>
+              </a:schemeClr>
+            </a:gs>
+          </a:gsLst>
+          <a:lin ang="5400000" scaled="0"/>
+        </a:gradFill>
+      </a:fillStyleLst>
+      <a:lnStyleLst>
+        <a:ln w="6350" cap="flat" cmpd="sng" algn="ctr">
+          <a:solidFill>
+            <a:schemeClr val="phClr"/>
+          </a:solidFill>
+          <a:prstDash val="solid"/>
+          <a:miter lim="800000"/>
+        </a:ln>
+        <a:ln w="12700" cap="flat" cmpd="sng" algn="ctr">
+          <a:solidFill>
+            <a:schemeClr val="phClr"/>
+          </a:solidFill>
+          <a:prstDash val="solid"/>
+          <a:miter lim="800000"/>
+        </a:ln>
+        <a:ln w="19050" cap="flat" cmpd="sng" algn="ctr">
+          <a:solidFill>
+            <a:schemeClr val="phClr"/>
+          </a:solidFill>
+          <a:prstDash val="solid"/>
+          <a:miter lim="800000"/>
+        </a:ln>
+      </a:lnStyleLst>
+      <a:effectStyleLst>
+        <a:effectStyle>
+          <a:effectLst/>
+        </a:effectStyle>
+        <a:effectStyle>
+          <a:effectLst/>
+        </a:effectStyle>
+        <a:effectStyle>
+          <a:effectLst>
+            <a:outerShdw blurRad="57150" dist="19050" dir="5400000" algn="ctr" rotWithShape="0">
+              <a:srgbClr val="000000">
+                <a:alpha val="63000"/>
+              </a:srgbClr>
+            </a:outerShdw>
+          </a:effectLst>
+        </a:effectStyle>
+      </a:effectStyleLst>
+      <a:bgFillStyleLst>
+        <a:solidFill>
+          <a:schemeClr val="phClr"/>
+        </a:solidFill>
+        <a:solidFill>
+          <a:schemeClr val="phClr">
+            <a:tint val="95000"/>
+            <a:satMod val="170000"/>
+          </a:schemeClr>
+        </a:solidFill>
+        <a:gradFill rotWithShape="1">
+          <a:gsLst>
+            <a:gs pos="0">
+              <a:schemeClr val="phClr">
+                <a:tint val="93000"/>
+                <a:satMod val="150000"/>
+                <a:shade val="98000"/>
+                <a:lumMod val="102000"/>
+              </a:schemeClr>
+            </a:gs>
+            <a:gs pos="50000">
+              <a:schemeClr val="phClr">
+                <a:tint val="98000"/>
+                <a:satMod val="130000"/>
+                <a:shade val="90000"/>
+                <a:lumMod val="103000"/>
+              </a:schemeClr>
+            </a:gs>
+            <a:gs pos="100000">
+              <a:schemeClr val="phClr">
+                <a:shade val="63000"/>
+                <a:satMod val="120000"/>
+              </a:schemeClr>
+            </a:gs>
+          </a:gsLst>
+          <a:lin ang="5400000" scaled="0"/>
+        </a:gradFill>
+      </a:bgFillStyleLst>
+    </a:fmtScheme>
+  </a:themeElements>
+  <a:objectDefaults/>
+  <a:extraClrSchemeLst/>
+  <a:extLst>
+    <a:ext uri="{05A4C25C-085E-4340-85A3-A5531E510DB2}">
+      <thm15:themeFamily xmlns:thm15="http://schemas.microsoft.com/office/thememl/2012/main" name="Office Theme" id="{62F939B6-93AF-4DB8-9C6B-D6C7DFDC589F}" vid="{4A3C46E8-61CC-4603-A589-7422A47A8E4A}"/>
+    </a:ext>
+  </a:extLst>
+</a:theme>
 </file>
</xml_diff>